<commit_message>
Slides basicos da apresentacao
</commit_message>
<xml_diff>
--- a/Apresentacao/Apresentacao.pptx
+++ b/Apresentacao/Apresentacao.pptx
@@ -2,19 +2,17 @@
 <file path=ppt/presentation.xml><?xml version="1.0" encoding="utf-8"?>
 <p:presentation xmlns:a="http://schemas.openxmlformats.org/drawingml/2006/main" xmlns:r="http://schemas.openxmlformats.org/officeDocument/2006/relationships" xmlns:p="http://schemas.openxmlformats.org/presentationml/2006/main" showSpecialPlsOnTitleSld="0" saveSubsetFonts="1">
   <p:sldMasterIdLst>
-    <p:sldMasterId id="2147483696" r:id="rId1"/>
+    <p:sldMasterId id="2147483708" r:id="rId1"/>
   </p:sldMasterIdLst>
   <p:notesMasterIdLst>
-    <p:notesMasterId r:id="rId7"/>
+    <p:notesMasterId r:id="rId5"/>
   </p:notesMasterIdLst>
   <p:sldIdLst>
     <p:sldId id="257" r:id="rId2"/>
     <p:sldId id="258" r:id="rId3"/>
-    <p:sldId id="259" r:id="rId4"/>
-    <p:sldId id="260" r:id="rId5"/>
-    <p:sldId id="261" r:id="rId6"/>
+    <p:sldId id="262" r:id="rId4"/>
   </p:sldIdLst>
-  <p:sldSz cx="12192000" cy="6858000"/>
+  <p:sldSz cx="9144000" cy="6858000" type="screen4x3"/>
   <p:notesSz cx="6858000" cy="9144000"/>
   <p:defaultTextStyle>
     <a:defPPr>
@@ -111,6 +109,11 @@
       </a:defRPr>
     </a:lvl9pPr>
   </p:defaultTextStyle>
+  <p:extLst>
+    <p:ext uri="{EFAFB233-063F-42B5-8137-9DF3F51BA10A}">
+      <p15:sldGuideLst xmlns:p15="http://schemas.microsoft.com/office/powerpoint/2012/main"/>
+    </p:ext>
+  </p:extLst>
 </p:presentation>
 </file>
 
@@ -196,7 +199,7 @@
           <a:p>
             <a:fld id="{4ECFF89F-550C-4129-B05B-5F50C6FAE430}" type="datetimeFigureOut">
               <a:rPr lang="pt-BR" smtClean="0"/>
-              <a:t>27/05/2014</a:t>
+              <a:t>28/05/2014</a:t>
             </a:fld>
             <a:endParaRPr lang="pt-BR"/>
           </a:p>
@@ -214,8 +217,8 @@
         </p:nvSpPr>
         <p:spPr>
           <a:xfrm>
-            <a:off x="685800" y="1143000"/>
-            <a:ext cx="5486400" cy="3086100"/>
+            <a:off x="1371600" y="1143000"/>
+            <a:ext cx="4114800" cy="3086100"/>
           </a:xfrm>
           <a:prstGeom prst="rect">
             <a:avLst/>
@@ -491,7 +494,12 @@
             <p:ph type="sldImg"/>
           </p:nvPr>
         </p:nvSpPr>
-        <p:spPr/>
+        <p:spPr>
+          <a:xfrm>
+            <a:off x="1371600" y="1143000"/>
+            <a:ext cx="4114800" cy="3086100"/>
+          </a:xfrm>
+        </p:spPr>
       </p:sp>
       <p:sp>
         <p:nvSpPr>
@@ -575,7 +583,12 @@
             <p:ph type="sldImg"/>
           </p:nvPr>
         </p:nvSpPr>
-        <p:spPr/>
+        <p:spPr>
+          <a:xfrm>
+            <a:off x="1371600" y="1143000"/>
+            <a:ext cx="4114800" cy="3086100"/>
+          </a:xfrm>
+        </p:spPr>
       </p:sp>
       <p:sp>
         <p:nvSpPr>
@@ -622,175 +635,7 @@
     </p:spTree>
     <p:extLst>
       <p:ext uri="{BB962C8B-B14F-4D97-AF65-F5344CB8AC3E}">
-        <p14:creationId xmlns:p14="http://schemas.microsoft.com/office/powerpoint/2010/main" val="2496421957"/>
-      </p:ext>
-    </p:extLst>
-  </p:cSld>
-  <p:clrMapOvr>
-    <a:masterClrMapping/>
-  </p:clrMapOvr>
-</p:notes>
-</file>
-
-<file path=ppt/notesSlides/notesSlide3.xml><?xml version="1.0" encoding="utf-8"?>
-<p:notes xmlns:a="http://schemas.openxmlformats.org/drawingml/2006/main" xmlns:r="http://schemas.openxmlformats.org/officeDocument/2006/relationships" xmlns:p="http://schemas.openxmlformats.org/presentationml/2006/main">
-  <p:cSld>
-    <p:spTree>
-      <p:nvGrpSpPr>
-        <p:cNvPr id="1" name=""/>
-        <p:cNvGrpSpPr/>
-        <p:nvPr/>
-      </p:nvGrpSpPr>
-      <p:grpSpPr>
-        <a:xfrm>
-          <a:off x="0" y="0"/>
-          <a:ext cx="0" cy="0"/>
-          <a:chOff x="0" y="0"/>
-          <a:chExt cx="0" cy="0"/>
-        </a:xfrm>
-      </p:grpSpPr>
-      <p:sp>
-        <p:nvSpPr>
-          <p:cNvPr id="2" name="Espaço Reservado para Imagem de Slide 1"/>
-          <p:cNvSpPr>
-            <a:spLocks noGrp="1" noRot="1" noChangeAspect="1"/>
-          </p:cNvSpPr>
-          <p:nvPr>
-            <p:ph type="sldImg"/>
-          </p:nvPr>
-        </p:nvSpPr>
-        <p:spPr/>
-      </p:sp>
-      <p:sp>
-        <p:nvSpPr>
-          <p:cNvPr id="3" name="Espaço Reservado para Anotações 2"/>
-          <p:cNvSpPr>
-            <a:spLocks noGrp="1"/>
-          </p:cNvSpPr>
-          <p:nvPr>
-            <p:ph type="body" idx="1"/>
-          </p:nvPr>
-        </p:nvSpPr>
-        <p:spPr/>
-        <p:txBody>
-          <a:bodyPr/>
-          <a:lstStyle/>
-          <a:p>
-            <a:endParaRPr lang="pt-BR"/>
-          </a:p>
-        </p:txBody>
-      </p:sp>
-      <p:sp>
-        <p:nvSpPr>
-          <p:cNvPr id="4" name="Espaço Reservado para Número de Slide 3"/>
-          <p:cNvSpPr>
-            <a:spLocks noGrp="1"/>
-          </p:cNvSpPr>
-          <p:nvPr>
-            <p:ph type="sldNum" sz="quarter" idx="10"/>
-          </p:nvPr>
-        </p:nvSpPr>
-        <p:spPr/>
-        <p:txBody>
-          <a:bodyPr/>
-          <a:lstStyle/>
-          <a:p>
-            <a:fld id="{1CA53FDC-004F-4EB0-83CE-561FF9E1969C}" type="slidenum">
-              <a:rPr lang="pt-BR" smtClean="0"/>
-              <a:t>4</a:t>
-            </a:fld>
-            <a:endParaRPr lang="pt-BR"/>
-          </a:p>
-        </p:txBody>
-      </p:sp>
-    </p:spTree>
-    <p:extLst>
-      <p:ext uri="{BB962C8B-B14F-4D97-AF65-F5344CB8AC3E}">
-        <p14:creationId xmlns:p14="http://schemas.microsoft.com/office/powerpoint/2010/main" val="1656167695"/>
-      </p:ext>
-    </p:extLst>
-  </p:cSld>
-  <p:clrMapOvr>
-    <a:masterClrMapping/>
-  </p:clrMapOvr>
-</p:notes>
-</file>
-
-<file path=ppt/notesSlides/notesSlide4.xml><?xml version="1.0" encoding="utf-8"?>
-<p:notes xmlns:a="http://schemas.openxmlformats.org/drawingml/2006/main" xmlns:r="http://schemas.openxmlformats.org/officeDocument/2006/relationships" xmlns:p="http://schemas.openxmlformats.org/presentationml/2006/main">
-  <p:cSld>
-    <p:spTree>
-      <p:nvGrpSpPr>
-        <p:cNvPr id="1" name=""/>
-        <p:cNvGrpSpPr/>
-        <p:nvPr/>
-      </p:nvGrpSpPr>
-      <p:grpSpPr>
-        <a:xfrm>
-          <a:off x="0" y="0"/>
-          <a:ext cx="0" cy="0"/>
-          <a:chOff x="0" y="0"/>
-          <a:chExt cx="0" cy="0"/>
-        </a:xfrm>
-      </p:grpSpPr>
-      <p:sp>
-        <p:nvSpPr>
-          <p:cNvPr id="2" name="Espaço Reservado para Imagem de Slide 1"/>
-          <p:cNvSpPr>
-            <a:spLocks noGrp="1" noRot="1" noChangeAspect="1"/>
-          </p:cNvSpPr>
-          <p:nvPr>
-            <p:ph type="sldImg"/>
-          </p:nvPr>
-        </p:nvSpPr>
-        <p:spPr/>
-      </p:sp>
-      <p:sp>
-        <p:nvSpPr>
-          <p:cNvPr id="3" name="Espaço Reservado para Anotações 2"/>
-          <p:cNvSpPr>
-            <a:spLocks noGrp="1"/>
-          </p:cNvSpPr>
-          <p:nvPr>
-            <p:ph type="body" idx="1"/>
-          </p:nvPr>
-        </p:nvSpPr>
-        <p:spPr/>
-        <p:txBody>
-          <a:bodyPr/>
-          <a:lstStyle/>
-          <a:p>
-            <a:endParaRPr lang="pt-BR"/>
-          </a:p>
-        </p:txBody>
-      </p:sp>
-      <p:sp>
-        <p:nvSpPr>
-          <p:cNvPr id="4" name="Espaço Reservado para Número de Slide 3"/>
-          <p:cNvSpPr>
-            <a:spLocks noGrp="1"/>
-          </p:cNvSpPr>
-          <p:nvPr>
-            <p:ph type="sldNum" sz="quarter" idx="10"/>
-          </p:nvPr>
-        </p:nvSpPr>
-        <p:spPr/>
-        <p:txBody>
-          <a:bodyPr/>
-          <a:lstStyle/>
-          <a:p>
-            <a:fld id="{1CA53FDC-004F-4EB0-83CE-561FF9E1969C}" type="slidenum">
-              <a:rPr lang="pt-BR" smtClean="0"/>
-              <a:t>5</a:t>
-            </a:fld>
-            <a:endParaRPr lang="pt-BR"/>
-          </a:p>
-        </p:txBody>
-      </p:sp>
-    </p:spTree>
-    <p:extLst>
-      <p:ext uri="{BB962C8B-B14F-4D97-AF65-F5344CB8AC3E}">
-        <p14:creationId xmlns:p14="http://schemas.microsoft.com/office/powerpoint/2010/main" val="688342670"/>
+        <p14:creationId xmlns:p14="http://schemas.microsoft.com/office/powerpoint/2010/main" val="2710605642"/>
       </p:ext>
     </p:extLst>
   </p:cSld>
@@ -819,7 +664,7 @@
       </p:grpSpPr>
       <p:sp>
         <p:nvSpPr>
-          <p:cNvPr id="2" name="Título 1"/>
+          <p:cNvPr id="2" name="Title 1"/>
           <p:cNvSpPr>
             <a:spLocks noGrp="1"/>
           </p:cNvSpPr>
@@ -829,8 +674,8 @@
         </p:nvSpPr>
         <p:spPr>
           <a:xfrm>
-            <a:off x="1524000" y="1122363"/>
-            <a:ext cx="9144000" cy="2387600"/>
+            <a:off x="685800" y="1122363"/>
+            <a:ext cx="7772400" cy="2387600"/>
           </a:xfrm>
         </p:spPr>
         <p:txBody>
@@ -845,13 +690,13 @@
               <a:rPr lang="pt-BR" smtClean="0"/>
               <a:t>Clique para editar o título mestre</a:t>
             </a:r>
-            <a:endParaRPr lang="pt-BR"/>
-          </a:p>
-        </p:txBody>
-      </p:sp>
-      <p:sp>
-        <p:nvSpPr>
-          <p:cNvPr id="3" name="Subtítulo 2"/>
+            <a:endParaRPr lang="en-US" dirty="0"/>
+          </a:p>
+        </p:txBody>
+      </p:sp>
+      <p:sp>
+        <p:nvSpPr>
+          <p:cNvPr id="3" name="Subtitle 2"/>
           <p:cNvSpPr>
             <a:spLocks noGrp="1"/>
           </p:cNvSpPr>
@@ -861,8 +706,8 @@
         </p:nvSpPr>
         <p:spPr>
           <a:xfrm>
-            <a:off x="1524000" y="3602038"/>
-            <a:ext cx="9144000" cy="1655762"/>
+            <a:off x="1143000" y="3602038"/>
+            <a:ext cx="6858000" cy="1655762"/>
           </a:xfrm>
         </p:spPr>
         <p:txBody>
@@ -910,13 +755,13 @@
               <a:rPr lang="pt-BR" smtClean="0"/>
               <a:t>Clique para editar o estilo do subtítulo mestre</a:t>
             </a:r>
-            <a:endParaRPr lang="pt-BR"/>
-          </a:p>
-        </p:txBody>
-      </p:sp>
-      <p:sp>
-        <p:nvSpPr>
-          <p:cNvPr id="4" name="Espaço Reservado para Data 3"/>
+            <a:endParaRPr lang="en-US" dirty="0"/>
+          </a:p>
+        </p:txBody>
+      </p:sp>
+      <p:sp>
+        <p:nvSpPr>
+          <p:cNvPr id="4" name="Date Placeholder 3"/>
           <p:cNvSpPr>
             <a:spLocks noGrp="1"/>
           </p:cNvSpPr>
@@ -931,7 +776,7 @@
           <a:p>
             <a:fld id="{4E4CBB3D-E4FE-4A11-A052-CD86F1E69DB8}" type="datetime1">
               <a:rPr lang="pt-BR" smtClean="0"/>
-              <a:t>27/05/2014</a:t>
+              <a:t>28/05/2014</a:t>
             </a:fld>
             <a:endParaRPr lang="pt-BR"/>
           </a:p>
@@ -939,7 +784,7 @@
       </p:sp>
       <p:sp>
         <p:nvSpPr>
-          <p:cNvPr id="5" name="Espaço Reservado para Rodapé 4"/>
+          <p:cNvPr id="5" name="Footer Placeholder 4"/>
           <p:cNvSpPr>
             <a:spLocks noGrp="1"/>
           </p:cNvSpPr>
@@ -962,7 +807,7 @@
       </p:sp>
       <p:sp>
         <p:nvSpPr>
-          <p:cNvPr id="6" name="Espaço Reservado para Número de Slide 5"/>
+          <p:cNvPr id="6" name="Slide Number Placeholder 5"/>
           <p:cNvSpPr>
             <a:spLocks noGrp="1"/>
           </p:cNvSpPr>
@@ -986,7 +831,7 @@
     </p:spTree>
     <p:extLst>
       <p:ext uri="{BB962C8B-B14F-4D97-AF65-F5344CB8AC3E}">
-        <p14:creationId xmlns:p14="http://schemas.microsoft.com/office/powerpoint/2010/main" val="2344167487"/>
+        <p14:creationId xmlns:p14="http://schemas.microsoft.com/office/powerpoint/2010/main" val="4162737786"/>
       </p:ext>
     </p:extLst>
   </p:cSld>
@@ -1015,7 +860,7 @@
       </p:grpSpPr>
       <p:sp>
         <p:nvSpPr>
-          <p:cNvPr id="2" name="Título 1"/>
+          <p:cNvPr id="2" name="Title 1"/>
           <p:cNvSpPr>
             <a:spLocks noGrp="1"/>
           </p:cNvSpPr>
@@ -1032,13 +877,13 @@
               <a:rPr lang="pt-BR" smtClean="0"/>
               <a:t>Clique para editar o título mestre</a:t>
             </a:r>
-            <a:endParaRPr lang="pt-BR"/>
-          </a:p>
-        </p:txBody>
-      </p:sp>
-      <p:sp>
-        <p:nvSpPr>
-          <p:cNvPr id="3" name="Espaço Reservado para Texto Vertical 2"/>
+            <a:endParaRPr lang="en-US" dirty="0"/>
+          </a:p>
+        </p:txBody>
+      </p:sp>
+      <p:sp>
+        <p:nvSpPr>
+          <p:cNvPr id="3" name="Vertical Text Placeholder 2"/>
           <p:cNvSpPr>
             <a:spLocks noGrp="1"/>
           </p:cNvSpPr>
@@ -1084,13 +929,13 @@
               <a:rPr lang="pt-BR" smtClean="0"/>
               <a:t>Quinto nível</a:t>
             </a:r>
-            <a:endParaRPr lang="pt-BR"/>
-          </a:p>
-        </p:txBody>
-      </p:sp>
-      <p:sp>
-        <p:nvSpPr>
-          <p:cNvPr id="4" name="Espaço Reservado para Data 3"/>
+            <a:endParaRPr lang="en-US" dirty="0"/>
+          </a:p>
+        </p:txBody>
+      </p:sp>
+      <p:sp>
+        <p:nvSpPr>
+          <p:cNvPr id="4" name="Date Placeholder 3"/>
           <p:cNvSpPr>
             <a:spLocks noGrp="1"/>
           </p:cNvSpPr>
@@ -1105,7 +950,7 @@
           <a:p>
             <a:fld id="{85B6E4B1-8EB5-4003-A55F-F71688338A99}" type="datetime1">
               <a:rPr lang="pt-BR" smtClean="0"/>
-              <a:t>27/05/2014</a:t>
+              <a:t>28/05/2014</a:t>
             </a:fld>
             <a:endParaRPr lang="pt-BR"/>
           </a:p>
@@ -1113,7 +958,7 @@
       </p:sp>
       <p:sp>
         <p:nvSpPr>
-          <p:cNvPr id="5" name="Espaço Reservado para Rodapé 4"/>
+          <p:cNvPr id="5" name="Footer Placeholder 4"/>
           <p:cNvSpPr>
             <a:spLocks noGrp="1"/>
           </p:cNvSpPr>
@@ -1136,7 +981,7 @@
       </p:sp>
       <p:sp>
         <p:nvSpPr>
-          <p:cNvPr id="6" name="Espaço Reservado para Número de Slide 5"/>
+          <p:cNvPr id="6" name="Slide Number Placeholder 5"/>
           <p:cNvSpPr>
             <a:spLocks noGrp="1"/>
           </p:cNvSpPr>
@@ -1160,7 +1005,7 @@
     </p:spTree>
     <p:extLst>
       <p:ext uri="{BB962C8B-B14F-4D97-AF65-F5344CB8AC3E}">
-        <p14:creationId xmlns:p14="http://schemas.microsoft.com/office/powerpoint/2010/main" val="3788614917"/>
+        <p14:creationId xmlns:p14="http://schemas.microsoft.com/office/powerpoint/2010/main" val="996571039"/>
       </p:ext>
     </p:extLst>
   </p:cSld>
@@ -1189,7 +1034,7 @@
       </p:grpSpPr>
       <p:sp>
         <p:nvSpPr>
-          <p:cNvPr id="2" name="Título Vertical 1"/>
+          <p:cNvPr id="2" name="Vertical Title 1"/>
           <p:cNvSpPr>
             <a:spLocks noGrp="1"/>
           </p:cNvSpPr>
@@ -1199,8 +1044,8 @@
         </p:nvSpPr>
         <p:spPr>
           <a:xfrm>
-            <a:off x="8724900" y="365125"/>
-            <a:ext cx="2628900" cy="5811838"/>
+            <a:off x="6543675" y="365125"/>
+            <a:ext cx="1971675" cy="5811838"/>
           </a:xfrm>
         </p:spPr>
         <p:txBody>
@@ -1211,13 +1056,13 @@
               <a:rPr lang="pt-BR" smtClean="0"/>
               <a:t>Clique para editar o título mestre</a:t>
             </a:r>
-            <a:endParaRPr lang="pt-BR"/>
-          </a:p>
-        </p:txBody>
-      </p:sp>
-      <p:sp>
-        <p:nvSpPr>
-          <p:cNvPr id="3" name="Espaço Reservado para Texto Vertical 2"/>
+            <a:endParaRPr lang="en-US" dirty="0"/>
+          </a:p>
+        </p:txBody>
+      </p:sp>
+      <p:sp>
+        <p:nvSpPr>
+          <p:cNvPr id="3" name="Vertical Text Placeholder 2"/>
           <p:cNvSpPr>
             <a:spLocks noGrp="1"/>
           </p:cNvSpPr>
@@ -1227,8 +1072,8 @@
         </p:nvSpPr>
         <p:spPr>
           <a:xfrm>
-            <a:off x="838200" y="365125"/>
-            <a:ext cx="7734300" cy="5811838"/>
+            <a:off x="628650" y="365125"/>
+            <a:ext cx="5800725" cy="5811838"/>
           </a:xfrm>
         </p:spPr>
         <p:txBody>
@@ -1268,13 +1113,13 @@
               <a:rPr lang="pt-BR" smtClean="0"/>
               <a:t>Quinto nível</a:t>
             </a:r>
-            <a:endParaRPr lang="pt-BR"/>
-          </a:p>
-        </p:txBody>
-      </p:sp>
-      <p:sp>
-        <p:nvSpPr>
-          <p:cNvPr id="4" name="Espaço Reservado para Data 3"/>
+            <a:endParaRPr lang="en-US" dirty="0"/>
+          </a:p>
+        </p:txBody>
+      </p:sp>
+      <p:sp>
+        <p:nvSpPr>
+          <p:cNvPr id="4" name="Date Placeholder 3"/>
           <p:cNvSpPr>
             <a:spLocks noGrp="1"/>
           </p:cNvSpPr>
@@ -1289,7 +1134,7 @@
           <a:p>
             <a:fld id="{EE51AD5F-C92F-4634-B5E4-2AC2D7CCADC3}" type="datetime1">
               <a:rPr lang="pt-BR" smtClean="0"/>
-              <a:t>27/05/2014</a:t>
+              <a:t>28/05/2014</a:t>
             </a:fld>
             <a:endParaRPr lang="pt-BR"/>
           </a:p>
@@ -1297,7 +1142,7 @@
       </p:sp>
       <p:sp>
         <p:nvSpPr>
-          <p:cNvPr id="5" name="Espaço Reservado para Rodapé 4"/>
+          <p:cNvPr id="5" name="Footer Placeholder 4"/>
           <p:cNvSpPr>
             <a:spLocks noGrp="1"/>
           </p:cNvSpPr>
@@ -1320,7 +1165,7 @@
       </p:sp>
       <p:sp>
         <p:nvSpPr>
-          <p:cNvPr id="6" name="Espaço Reservado para Número de Slide 5"/>
+          <p:cNvPr id="6" name="Slide Number Placeholder 5"/>
           <p:cNvSpPr>
             <a:spLocks noGrp="1"/>
           </p:cNvSpPr>
@@ -1344,7 +1189,7 @@
     </p:spTree>
     <p:extLst>
       <p:ext uri="{BB962C8B-B14F-4D97-AF65-F5344CB8AC3E}">
-        <p14:creationId xmlns:p14="http://schemas.microsoft.com/office/powerpoint/2010/main" val="2807699292"/>
+        <p14:creationId xmlns:p14="http://schemas.microsoft.com/office/powerpoint/2010/main" val="3972773614"/>
       </p:ext>
     </p:extLst>
   </p:cSld>
@@ -1373,7 +1218,7 @@
       </p:grpSpPr>
       <p:sp>
         <p:nvSpPr>
-          <p:cNvPr id="2" name="Título 1"/>
+          <p:cNvPr id="2" name="Title 1"/>
           <p:cNvSpPr>
             <a:spLocks noGrp="1"/>
           </p:cNvSpPr>
@@ -1390,13 +1235,13 @@
               <a:rPr lang="pt-BR" smtClean="0"/>
               <a:t>Clique para editar o título mestre</a:t>
             </a:r>
-            <a:endParaRPr lang="pt-BR"/>
-          </a:p>
-        </p:txBody>
-      </p:sp>
-      <p:sp>
-        <p:nvSpPr>
-          <p:cNvPr id="3" name="Espaço Reservado para Conteúdo 2"/>
+            <a:endParaRPr lang="en-US" dirty="0"/>
+          </a:p>
+        </p:txBody>
+      </p:sp>
+      <p:sp>
+        <p:nvSpPr>
+          <p:cNvPr id="3" name="Content Placeholder 2"/>
           <p:cNvSpPr>
             <a:spLocks noGrp="1"/>
           </p:cNvSpPr>
@@ -1442,13 +1287,13 @@
               <a:rPr lang="pt-BR" smtClean="0"/>
               <a:t>Quinto nível</a:t>
             </a:r>
-            <a:endParaRPr lang="pt-BR"/>
-          </a:p>
-        </p:txBody>
-      </p:sp>
-      <p:sp>
-        <p:nvSpPr>
-          <p:cNvPr id="4" name="Espaço Reservado para Data 3"/>
+            <a:endParaRPr lang="en-US" dirty="0"/>
+          </a:p>
+        </p:txBody>
+      </p:sp>
+      <p:sp>
+        <p:nvSpPr>
+          <p:cNvPr id="4" name="Date Placeholder 3"/>
           <p:cNvSpPr>
             <a:spLocks noGrp="1"/>
           </p:cNvSpPr>
@@ -1463,7 +1308,7 @@
           <a:p>
             <a:fld id="{AF7A6B12-C301-43C9-80E8-1904ED727E75}" type="datetime1">
               <a:rPr lang="pt-BR" smtClean="0"/>
-              <a:t>27/05/2014</a:t>
+              <a:t>28/05/2014</a:t>
             </a:fld>
             <a:endParaRPr lang="pt-BR"/>
           </a:p>
@@ -1471,7 +1316,7 @@
       </p:sp>
       <p:sp>
         <p:nvSpPr>
-          <p:cNvPr id="5" name="Espaço Reservado para Rodapé 4"/>
+          <p:cNvPr id="5" name="Footer Placeholder 4"/>
           <p:cNvSpPr>
             <a:spLocks noGrp="1"/>
           </p:cNvSpPr>
@@ -1494,7 +1339,7 @@
       </p:sp>
       <p:sp>
         <p:nvSpPr>
-          <p:cNvPr id="6" name="Espaço Reservado para Número de Slide 5"/>
+          <p:cNvPr id="6" name="Slide Number Placeholder 5"/>
           <p:cNvSpPr>
             <a:spLocks noGrp="1"/>
           </p:cNvSpPr>
@@ -1518,7 +1363,7 @@
     </p:spTree>
     <p:extLst>
       <p:ext uri="{BB962C8B-B14F-4D97-AF65-F5344CB8AC3E}">
-        <p14:creationId xmlns:p14="http://schemas.microsoft.com/office/powerpoint/2010/main" val="1725342199"/>
+        <p14:creationId xmlns:p14="http://schemas.microsoft.com/office/powerpoint/2010/main" val="2197190974"/>
       </p:ext>
     </p:extLst>
   </p:cSld>
@@ -1547,7 +1392,7 @@
       </p:grpSpPr>
       <p:sp>
         <p:nvSpPr>
-          <p:cNvPr id="2" name="Título 1"/>
+          <p:cNvPr id="2" name="Title 1"/>
           <p:cNvSpPr>
             <a:spLocks noGrp="1"/>
           </p:cNvSpPr>
@@ -1557,8 +1402,8 @@
         </p:nvSpPr>
         <p:spPr>
           <a:xfrm>
-            <a:off x="831850" y="1709738"/>
-            <a:ext cx="10515600" cy="2852737"/>
+            <a:off x="623888" y="1709739"/>
+            <a:ext cx="7886700" cy="2852737"/>
           </a:xfrm>
         </p:spPr>
         <p:txBody>
@@ -1573,13 +1418,13 @@
               <a:rPr lang="pt-BR" smtClean="0"/>
               <a:t>Clique para editar o título mestre</a:t>
             </a:r>
-            <a:endParaRPr lang="pt-BR"/>
-          </a:p>
-        </p:txBody>
-      </p:sp>
-      <p:sp>
-        <p:nvSpPr>
-          <p:cNvPr id="3" name="Espaço Reservado para Texto 2"/>
+            <a:endParaRPr lang="en-US" dirty="0"/>
+          </a:p>
+        </p:txBody>
+      </p:sp>
+      <p:sp>
+        <p:nvSpPr>
+          <p:cNvPr id="3" name="Text Placeholder 2"/>
           <p:cNvSpPr>
             <a:spLocks noGrp="1"/>
           </p:cNvSpPr>
@@ -1589,8 +1434,8 @@
         </p:nvSpPr>
         <p:spPr>
           <a:xfrm>
-            <a:off x="831850" y="4589463"/>
-            <a:ext cx="10515600" cy="1500187"/>
+            <a:off x="623888" y="4589464"/>
+            <a:ext cx="7886700" cy="1500187"/>
           </a:xfrm>
         </p:spPr>
         <p:txBody>
@@ -1600,9 +1445,7 @@
               <a:buNone/>
               <a:defRPr sz="2400">
                 <a:solidFill>
-                  <a:schemeClr val="tx1">
-                    <a:tint val="75000"/>
-                  </a:schemeClr>
+                  <a:schemeClr val="tx1"/>
                 </a:solidFill>
               </a:defRPr>
             </a:lvl1pPr>
@@ -1698,7 +1541,7 @@
       </p:sp>
       <p:sp>
         <p:nvSpPr>
-          <p:cNvPr id="4" name="Espaço Reservado para Data 3"/>
+          <p:cNvPr id="4" name="Date Placeholder 3"/>
           <p:cNvSpPr>
             <a:spLocks noGrp="1"/>
           </p:cNvSpPr>
@@ -1713,7 +1556,7 @@
           <a:p>
             <a:fld id="{EA74DE8B-95BD-4532-8D9F-959F73581BCD}" type="datetime1">
               <a:rPr lang="pt-BR" smtClean="0"/>
-              <a:t>27/05/2014</a:t>
+              <a:t>28/05/2014</a:t>
             </a:fld>
             <a:endParaRPr lang="pt-BR"/>
           </a:p>
@@ -1721,7 +1564,7 @@
       </p:sp>
       <p:sp>
         <p:nvSpPr>
-          <p:cNvPr id="5" name="Espaço Reservado para Rodapé 4"/>
+          <p:cNvPr id="5" name="Footer Placeholder 4"/>
           <p:cNvSpPr>
             <a:spLocks noGrp="1"/>
           </p:cNvSpPr>
@@ -1744,7 +1587,7 @@
       </p:sp>
       <p:sp>
         <p:nvSpPr>
-          <p:cNvPr id="6" name="Espaço Reservado para Número de Slide 5"/>
+          <p:cNvPr id="6" name="Slide Number Placeholder 5"/>
           <p:cNvSpPr>
             <a:spLocks noGrp="1"/>
           </p:cNvSpPr>
@@ -1768,7 +1611,7 @@
     </p:spTree>
     <p:extLst>
       <p:ext uri="{BB962C8B-B14F-4D97-AF65-F5344CB8AC3E}">
-        <p14:creationId xmlns:p14="http://schemas.microsoft.com/office/powerpoint/2010/main" val="1599146963"/>
+        <p14:creationId xmlns:p14="http://schemas.microsoft.com/office/powerpoint/2010/main" val="3690658574"/>
       </p:ext>
     </p:extLst>
   </p:cSld>
@@ -1797,7 +1640,7 @@
       </p:grpSpPr>
       <p:sp>
         <p:nvSpPr>
-          <p:cNvPr id="2" name="Título 1"/>
+          <p:cNvPr id="2" name="Title 1"/>
           <p:cNvSpPr>
             <a:spLocks noGrp="1"/>
           </p:cNvSpPr>
@@ -1814,13 +1657,13 @@
               <a:rPr lang="pt-BR" smtClean="0"/>
               <a:t>Clique para editar o título mestre</a:t>
             </a:r>
-            <a:endParaRPr lang="pt-BR"/>
-          </a:p>
-        </p:txBody>
-      </p:sp>
-      <p:sp>
-        <p:nvSpPr>
-          <p:cNvPr id="3" name="Espaço Reservado para Conteúdo 2"/>
+            <a:endParaRPr lang="en-US" dirty="0"/>
+          </a:p>
+        </p:txBody>
+      </p:sp>
+      <p:sp>
+        <p:nvSpPr>
+          <p:cNvPr id="3" name="Content Placeholder 2"/>
           <p:cNvSpPr>
             <a:spLocks noGrp="1"/>
           </p:cNvSpPr>
@@ -1830,8 +1673,8 @@
         </p:nvSpPr>
         <p:spPr>
           <a:xfrm>
-            <a:off x="838200" y="1825625"/>
-            <a:ext cx="5181600" cy="4351338"/>
+            <a:off x="628650" y="1825625"/>
+            <a:ext cx="3886200" cy="4351338"/>
           </a:xfrm>
         </p:spPr>
         <p:txBody>
@@ -1871,13 +1714,13 @@
               <a:rPr lang="pt-BR" smtClean="0"/>
               <a:t>Quinto nível</a:t>
             </a:r>
-            <a:endParaRPr lang="pt-BR"/>
-          </a:p>
-        </p:txBody>
-      </p:sp>
-      <p:sp>
-        <p:nvSpPr>
-          <p:cNvPr id="4" name="Espaço Reservado para Conteúdo 3"/>
+            <a:endParaRPr lang="en-US" dirty="0"/>
+          </a:p>
+        </p:txBody>
+      </p:sp>
+      <p:sp>
+        <p:nvSpPr>
+          <p:cNvPr id="4" name="Content Placeholder 3"/>
           <p:cNvSpPr>
             <a:spLocks noGrp="1"/>
           </p:cNvSpPr>
@@ -1887,8 +1730,8 @@
         </p:nvSpPr>
         <p:spPr>
           <a:xfrm>
-            <a:off x="6172200" y="1825625"/>
-            <a:ext cx="5181600" cy="4351338"/>
+            <a:off x="4629150" y="1825625"/>
+            <a:ext cx="3886200" cy="4351338"/>
           </a:xfrm>
         </p:spPr>
         <p:txBody>
@@ -1928,13 +1771,13 @@
               <a:rPr lang="pt-BR" smtClean="0"/>
               <a:t>Quinto nível</a:t>
             </a:r>
-            <a:endParaRPr lang="pt-BR"/>
-          </a:p>
-        </p:txBody>
-      </p:sp>
-      <p:sp>
-        <p:nvSpPr>
-          <p:cNvPr id="5" name="Espaço Reservado para Data 4"/>
+            <a:endParaRPr lang="en-US" dirty="0"/>
+          </a:p>
+        </p:txBody>
+      </p:sp>
+      <p:sp>
+        <p:nvSpPr>
+          <p:cNvPr id="5" name="Date Placeholder 4"/>
           <p:cNvSpPr>
             <a:spLocks noGrp="1"/>
           </p:cNvSpPr>
@@ -1949,7 +1792,7 @@
           <a:p>
             <a:fld id="{F77646EA-F905-42E6-8D41-D210E3D1B3B0}" type="datetime1">
               <a:rPr lang="pt-BR" smtClean="0"/>
-              <a:t>27/05/2014</a:t>
+              <a:t>28/05/2014</a:t>
             </a:fld>
             <a:endParaRPr lang="pt-BR"/>
           </a:p>
@@ -1957,7 +1800,7 @@
       </p:sp>
       <p:sp>
         <p:nvSpPr>
-          <p:cNvPr id="6" name="Espaço Reservado para Rodapé 5"/>
+          <p:cNvPr id="6" name="Footer Placeholder 5"/>
           <p:cNvSpPr>
             <a:spLocks noGrp="1"/>
           </p:cNvSpPr>
@@ -1980,7 +1823,7 @@
       </p:sp>
       <p:sp>
         <p:nvSpPr>
-          <p:cNvPr id="7" name="Espaço Reservado para Número de Slide 6"/>
+          <p:cNvPr id="7" name="Slide Number Placeholder 6"/>
           <p:cNvSpPr>
             <a:spLocks noGrp="1"/>
           </p:cNvSpPr>
@@ -2004,7 +1847,7 @@
     </p:spTree>
     <p:extLst>
       <p:ext uri="{BB962C8B-B14F-4D97-AF65-F5344CB8AC3E}">
-        <p14:creationId xmlns:p14="http://schemas.microsoft.com/office/powerpoint/2010/main" val="3893578648"/>
+        <p14:creationId xmlns:p14="http://schemas.microsoft.com/office/powerpoint/2010/main" val="3753570155"/>
       </p:ext>
     </p:extLst>
   </p:cSld>
@@ -2033,7 +1876,7 @@
       </p:grpSpPr>
       <p:sp>
         <p:nvSpPr>
-          <p:cNvPr id="2" name="Título 1"/>
+          <p:cNvPr id="2" name="Title 1"/>
           <p:cNvSpPr>
             <a:spLocks noGrp="1"/>
           </p:cNvSpPr>
@@ -2043,8 +1886,8 @@
         </p:nvSpPr>
         <p:spPr>
           <a:xfrm>
-            <a:off x="839788" y="365125"/>
-            <a:ext cx="10515600" cy="1325563"/>
+            <a:off x="629841" y="365126"/>
+            <a:ext cx="7886700" cy="1325563"/>
           </a:xfrm>
         </p:spPr>
         <p:txBody>
@@ -2055,13 +1898,13 @@
               <a:rPr lang="pt-BR" smtClean="0"/>
               <a:t>Clique para editar o título mestre</a:t>
             </a:r>
-            <a:endParaRPr lang="pt-BR"/>
-          </a:p>
-        </p:txBody>
-      </p:sp>
-      <p:sp>
-        <p:nvSpPr>
-          <p:cNvPr id="3" name="Espaço Reservado para Texto 2"/>
+            <a:endParaRPr lang="en-US" dirty="0"/>
+          </a:p>
+        </p:txBody>
+      </p:sp>
+      <p:sp>
+        <p:nvSpPr>
+          <p:cNvPr id="3" name="Text Placeholder 2"/>
           <p:cNvSpPr>
             <a:spLocks noGrp="1"/>
           </p:cNvSpPr>
@@ -2071,8 +1914,8 @@
         </p:nvSpPr>
         <p:spPr>
           <a:xfrm>
-            <a:off x="839788" y="1681163"/>
-            <a:ext cx="5157787" cy="823912"/>
+            <a:off x="629842" y="1681163"/>
+            <a:ext cx="3868340" cy="823912"/>
           </a:xfrm>
         </p:spPr>
         <p:txBody>
@@ -2126,7 +1969,7 @@
       </p:sp>
       <p:sp>
         <p:nvSpPr>
-          <p:cNvPr id="4" name="Espaço Reservado para Conteúdo 3"/>
+          <p:cNvPr id="4" name="Content Placeholder 3"/>
           <p:cNvSpPr>
             <a:spLocks noGrp="1"/>
           </p:cNvSpPr>
@@ -2136,8 +1979,8 @@
         </p:nvSpPr>
         <p:spPr>
           <a:xfrm>
-            <a:off x="839788" y="2505075"/>
-            <a:ext cx="5157787" cy="3684588"/>
+            <a:off x="629842" y="2505075"/>
+            <a:ext cx="3868340" cy="3684588"/>
           </a:xfrm>
         </p:spPr>
         <p:txBody>
@@ -2177,13 +2020,13 @@
               <a:rPr lang="pt-BR" smtClean="0"/>
               <a:t>Quinto nível</a:t>
             </a:r>
-            <a:endParaRPr lang="pt-BR"/>
-          </a:p>
-        </p:txBody>
-      </p:sp>
-      <p:sp>
-        <p:nvSpPr>
-          <p:cNvPr id="5" name="Espaço Reservado para Texto 4"/>
+            <a:endParaRPr lang="en-US" dirty="0"/>
+          </a:p>
+        </p:txBody>
+      </p:sp>
+      <p:sp>
+        <p:nvSpPr>
+          <p:cNvPr id="5" name="Text Placeholder 4"/>
           <p:cNvSpPr>
             <a:spLocks noGrp="1"/>
           </p:cNvSpPr>
@@ -2193,8 +2036,8 @@
         </p:nvSpPr>
         <p:spPr>
           <a:xfrm>
-            <a:off x="6172200" y="1681163"/>
-            <a:ext cx="5183188" cy="823912"/>
+            <a:off x="4629150" y="1681163"/>
+            <a:ext cx="3887391" cy="823912"/>
           </a:xfrm>
         </p:spPr>
         <p:txBody>
@@ -2248,7 +2091,7 @@
       </p:sp>
       <p:sp>
         <p:nvSpPr>
-          <p:cNvPr id="6" name="Espaço Reservado para Conteúdo 5"/>
+          <p:cNvPr id="6" name="Content Placeholder 5"/>
           <p:cNvSpPr>
             <a:spLocks noGrp="1"/>
           </p:cNvSpPr>
@@ -2258,8 +2101,8 @@
         </p:nvSpPr>
         <p:spPr>
           <a:xfrm>
-            <a:off x="6172200" y="2505075"/>
-            <a:ext cx="5183188" cy="3684588"/>
+            <a:off x="4629150" y="2505075"/>
+            <a:ext cx="3887391" cy="3684588"/>
           </a:xfrm>
         </p:spPr>
         <p:txBody>
@@ -2299,13 +2142,13 @@
               <a:rPr lang="pt-BR" smtClean="0"/>
               <a:t>Quinto nível</a:t>
             </a:r>
-            <a:endParaRPr lang="pt-BR"/>
-          </a:p>
-        </p:txBody>
-      </p:sp>
-      <p:sp>
-        <p:nvSpPr>
-          <p:cNvPr id="7" name="Espaço Reservado para Data 6"/>
+            <a:endParaRPr lang="en-US" dirty="0"/>
+          </a:p>
+        </p:txBody>
+      </p:sp>
+      <p:sp>
+        <p:nvSpPr>
+          <p:cNvPr id="7" name="Date Placeholder 6"/>
           <p:cNvSpPr>
             <a:spLocks noGrp="1"/>
           </p:cNvSpPr>
@@ -2320,7 +2163,7 @@
           <a:p>
             <a:fld id="{E98BCC9A-F90A-483B-B5C3-D9CD1D9023C3}" type="datetime1">
               <a:rPr lang="pt-BR" smtClean="0"/>
-              <a:t>27/05/2014</a:t>
+              <a:t>28/05/2014</a:t>
             </a:fld>
             <a:endParaRPr lang="pt-BR"/>
           </a:p>
@@ -2328,7 +2171,7 @@
       </p:sp>
       <p:sp>
         <p:nvSpPr>
-          <p:cNvPr id="8" name="Espaço Reservado para Rodapé 7"/>
+          <p:cNvPr id="8" name="Footer Placeholder 7"/>
           <p:cNvSpPr>
             <a:spLocks noGrp="1"/>
           </p:cNvSpPr>
@@ -2351,7 +2194,7 @@
       </p:sp>
       <p:sp>
         <p:nvSpPr>
-          <p:cNvPr id="9" name="Espaço Reservado para Número de Slide 8"/>
+          <p:cNvPr id="9" name="Slide Number Placeholder 8"/>
           <p:cNvSpPr>
             <a:spLocks noGrp="1"/>
           </p:cNvSpPr>
@@ -2375,7 +2218,7 @@
     </p:spTree>
     <p:extLst>
       <p:ext uri="{BB962C8B-B14F-4D97-AF65-F5344CB8AC3E}">
-        <p14:creationId xmlns:p14="http://schemas.microsoft.com/office/powerpoint/2010/main" val="2617680189"/>
+        <p14:creationId xmlns:p14="http://schemas.microsoft.com/office/powerpoint/2010/main" val="1547119026"/>
       </p:ext>
     </p:extLst>
   </p:cSld>
@@ -2404,7 +2247,7 @@
       </p:grpSpPr>
       <p:sp>
         <p:nvSpPr>
-          <p:cNvPr id="2" name="Título 1"/>
+          <p:cNvPr id="2" name="Title 1"/>
           <p:cNvSpPr>
             <a:spLocks noGrp="1"/>
           </p:cNvSpPr>
@@ -2421,13 +2264,13 @@
               <a:rPr lang="pt-BR" smtClean="0"/>
               <a:t>Clique para editar o título mestre</a:t>
             </a:r>
-            <a:endParaRPr lang="pt-BR"/>
-          </a:p>
-        </p:txBody>
-      </p:sp>
-      <p:sp>
-        <p:nvSpPr>
-          <p:cNvPr id="3" name="Espaço Reservado para Data 2"/>
+            <a:endParaRPr lang="en-US" dirty="0"/>
+          </a:p>
+        </p:txBody>
+      </p:sp>
+      <p:sp>
+        <p:nvSpPr>
+          <p:cNvPr id="3" name="Date Placeholder 2"/>
           <p:cNvSpPr>
             <a:spLocks noGrp="1"/>
           </p:cNvSpPr>
@@ -2442,7 +2285,7 @@
           <a:p>
             <a:fld id="{ABF218CA-9C70-47FE-864A-E0F0D85E9FF8}" type="datetime1">
               <a:rPr lang="pt-BR" smtClean="0"/>
-              <a:t>27/05/2014</a:t>
+              <a:t>28/05/2014</a:t>
             </a:fld>
             <a:endParaRPr lang="pt-BR"/>
           </a:p>
@@ -2450,7 +2293,7 @@
       </p:sp>
       <p:sp>
         <p:nvSpPr>
-          <p:cNvPr id="4" name="Espaço Reservado para Rodapé 3"/>
+          <p:cNvPr id="4" name="Footer Placeholder 3"/>
           <p:cNvSpPr>
             <a:spLocks noGrp="1"/>
           </p:cNvSpPr>
@@ -2473,7 +2316,7 @@
       </p:sp>
       <p:sp>
         <p:nvSpPr>
-          <p:cNvPr id="5" name="Espaço Reservado para Número de Slide 4"/>
+          <p:cNvPr id="5" name="Slide Number Placeholder 4"/>
           <p:cNvSpPr>
             <a:spLocks noGrp="1"/>
           </p:cNvSpPr>
@@ -2497,7 +2340,7 @@
     </p:spTree>
     <p:extLst>
       <p:ext uri="{BB962C8B-B14F-4D97-AF65-F5344CB8AC3E}">
-        <p14:creationId xmlns:p14="http://schemas.microsoft.com/office/powerpoint/2010/main" val="3138294351"/>
+        <p14:creationId xmlns:p14="http://schemas.microsoft.com/office/powerpoint/2010/main" val="2307574122"/>
       </p:ext>
     </p:extLst>
   </p:cSld>
@@ -2526,7 +2369,7 @@
       </p:grpSpPr>
       <p:sp>
         <p:nvSpPr>
-          <p:cNvPr id="2" name="Espaço Reservado para Data 1"/>
+          <p:cNvPr id="2" name="Date Placeholder 1"/>
           <p:cNvSpPr>
             <a:spLocks noGrp="1"/>
           </p:cNvSpPr>
@@ -2541,7 +2384,7 @@
           <a:p>
             <a:fld id="{8F9C4DB3-2DD8-4972-89FE-90673AEDB76E}" type="datetime1">
               <a:rPr lang="pt-BR" smtClean="0"/>
-              <a:t>27/05/2014</a:t>
+              <a:t>28/05/2014</a:t>
             </a:fld>
             <a:endParaRPr lang="pt-BR"/>
           </a:p>
@@ -2549,7 +2392,7 @@
       </p:sp>
       <p:sp>
         <p:nvSpPr>
-          <p:cNvPr id="3" name="Espaço Reservado para Rodapé 2"/>
+          <p:cNvPr id="3" name="Footer Placeholder 2"/>
           <p:cNvSpPr>
             <a:spLocks noGrp="1"/>
           </p:cNvSpPr>
@@ -2572,7 +2415,7 @@
       </p:sp>
       <p:sp>
         <p:nvSpPr>
-          <p:cNvPr id="4" name="Espaço Reservado para Número de Slide 3"/>
+          <p:cNvPr id="4" name="Slide Number Placeholder 3"/>
           <p:cNvSpPr>
             <a:spLocks noGrp="1"/>
           </p:cNvSpPr>
@@ -2596,7 +2439,7 @@
     </p:spTree>
     <p:extLst>
       <p:ext uri="{BB962C8B-B14F-4D97-AF65-F5344CB8AC3E}">
-        <p14:creationId xmlns:p14="http://schemas.microsoft.com/office/powerpoint/2010/main" val="864499322"/>
+        <p14:creationId xmlns:p14="http://schemas.microsoft.com/office/powerpoint/2010/main" val="3357530376"/>
       </p:ext>
     </p:extLst>
   </p:cSld>
@@ -2625,7 +2468,7 @@
       </p:grpSpPr>
       <p:sp>
         <p:nvSpPr>
-          <p:cNvPr id="2" name="Título 1"/>
+          <p:cNvPr id="2" name="Title 1"/>
           <p:cNvSpPr>
             <a:spLocks noGrp="1"/>
           </p:cNvSpPr>
@@ -2635,8 +2478,8 @@
         </p:nvSpPr>
         <p:spPr>
           <a:xfrm>
-            <a:off x="839788" y="457200"/>
-            <a:ext cx="3932237" cy="1600200"/>
+            <a:off x="629841" y="457200"/>
+            <a:ext cx="2949178" cy="1600200"/>
           </a:xfrm>
         </p:spPr>
         <p:txBody>
@@ -2651,13 +2494,13 @@
               <a:rPr lang="pt-BR" smtClean="0"/>
               <a:t>Clique para editar o título mestre</a:t>
             </a:r>
-            <a:endParaRPr lang="pt-BR"/>
-          </a:p>
-        </p:txBody>
-      </p:sp>
-      <p:sp>
-        <p:nvSpPr>
-          <p:cNvPr id="3" name="Espaço Reservado para Conteúdo 2"/>
+            <a:endParaRPr lang="en-US" dirty="0"/>
+          </a:p>
+        </p:txBody>
+      </p:sp>
+      <p:sp>
+        <p:nvSpPr>
+          <p:cNvPr id="3" name="Content Placeholder 2"/>
           <p:cNvSpPr>
             <a:spLocks noGrp="1"/>
           </p:cNvSpPr>
@@ -2667,8 +2510,8 @@
         </p:nvSpPr>
         <p:spPr>
           <a:xfrm>
-            <a:off x="5183188" y="987425"/>
-            <a:ext cx="6172200" cy="4873625"/>
+            <a:off x="3887391" y="987426"/>
+            <a:ext cx="4629150" cy="4873625"/>
           </a:xfrm>
         </p:spPr>
         <p:txBody>
@@ -2736,13 +2579,13 @@
               <a:rPr lang="pt-BR" smtClean="0"/>
               <a:t>Quinto nível</a:t>
             </a:r>
-            <a:endParaRPr lang="pt-BR"/>
-          </a:p>
-        </p:txBody>
-      </p:sp>
-      <p:sp>
-        <p:nvSpPr>
-          <p:cNvPr id="4" name="Espaço Reservado para Texto 3"/>
+            <a:endParaRPr lang="en-US" dirty="0"/>
+          </a:p>
+        </p:txBody>
+      </p:sp>
+      <p:sp>
+        <p:nvSpPr>
+          <p:cNvPr id="4" name="Text Placeholder 3"/>
           <p:cNvSpPr>
             <a:spLocks noGrp="1"/>
           </p:cNvSpPr>
@@ -2752,8 +2595,8 @@
         </p:nvSpPr>
         <p:spPr>
           <a:xfrm>
-            <a:off x="839788" y="2057400"/>
-            <a:ext cx="3932237" cy="3811588"/>
+            <a:off x="629841" y="2057400"/>
+            <a:ext cx="2949178" cy="3811588"/>
           </a:xfrm>
         </p:spPr>
         <p:txBody>
@@ -2807,7 +2650,7 @@
       </p:sp>
       <p:sp>
         <p:nvSpPr>
-          <p:cNvPr id="5" name="Espaço Reservado para Data 4"/>
+          <p:cNvPr id="5" name="Date Placeholder 4"/>
           <p:cNvSpPr>
             <a:spLocks noGrp="1"/>
           </p:cNvSpPr>
@@ -2822,7 +2665,7 @@
           <a:p>
             <a:fld id="{23E76DDB-37F4-496B-8C9E-0114879CEB09}" type="datetime1">
               <a:rPr lang="pt-BR" smtClean="0"/>
-              <a:t>27/05/2014</a:t>
+              <a:t>28/05/2014</a:t>
             </a:fld>
             <a:endParaRPr lang="pt-BR"/>
           </a:p>
@@ -2830,7 +2673,7 @@
       </p:sp>
       <p:sp>
         <p:nvSpPr>
-          <p:cNvPr id="6" name="Espaço Reservado para Rodapé 5"/>
+          <p:cNvPr id="6" name="Footer Placeholder 5"/>
           <p:cNvSpPr>
             <a:spLocks noGrp="1"/>
           </p:cNvSpPr>
@@ -2853,7 +2696,7 @@
       </p:sp>
       <p:sp>
         <p:nvSpPr>
-          <p:cNvPr id="7" name="Espaço Reservado para Número de Slide 6"/>
+          <p:cNvPr id="7" name="Slide Number Placeholder 6"/>
           <p:cNvSpPr>
             <a:spLocks noGrp="1"/>
           </p:cNvSpPr>
@@ -2877,7 +2720,7 @@
     </p:spTree>
     <p:extLst>
       <p:ext uri="{BB962C8B-B14F-4D97-AF65-F5344CB8AC3E}">
-        <p14:creationId xmlns:p14="http://schemas.microsoft.com/office/powerpoint/2010/main" val="3282088461"/>
+        <p14:creationId xmlns:p14="http://schemas.microsoft.com/office/powerpoint/2010/main" val="284601752"/>
       </p:ext>
     </p:extLst>
   </p:cSld>
@@ -2906,7 +2749,7 @@
       </p:grpSpPr>
       <p:sp>
         <p:nvSpPr>
-          <p:cNvPr id="2" name="Título 1"/>
+          <p:cNvPr id="2" name="Title 1"/>
           <p:cNvSpPr>
             <a:spLocks noGrp="1"/>
           </p:cNvSpPr>
@@ -2916,8 +2759,8 @@
         </p:nvSpPr>
         <p:spPr>
           <a:xfrm>
-            <a:off x="839788" y="457200"/>
-            <a:ext cx="3932237" cy="1600200"/>
+            <a:off x="629841" y="457200"/>
+            <a:ext cx="2949178" cy="1600200"/>
           </a:xfrm>
         </p:spPr>
         <p:txBody>
@@ -2932,15 +2775,15 @@
               <a:rPr lang="pt-BR" smtClean="0"/>
               <a:t>Clique para editar o título mestre</a:t>
             </a:r>
-            <a:endParaRPr lang="pt-BR"/>
-          </a:p>
-        </p:txBody>
-      </p:sp>
-      <p:sp>
-        <p:nvSpPr>
-          <p:cNvPr id="3" name="Espaço Reservado para Imagem 2"/>
-          <p:cNvSpPr>
-            <a:spLocks noGrp="1"/>
+            <a:endParaRPr lang="en-US" dirty="0"/>
+          </a:p>
+        </p:txBody>
+      </p:sp>
+      <p:sp>
+        <p:nvSpPr>
+          <p:cNvPr id="3" name="Picture Placeholder 2"/>
+          <p:cNvSpPr>
+            <a:spLocks noGrp="1" noChangeAspect="1"/>
           </p:cNvSpPr>
           <p:nvPr>
             <p:ph type="pic" idx="1"/>
@@ -2948,12 +2791,12 @@
         </p:nvSpPr>
         <p:spPr>
           <a:xfrm>
-            <a:off x="5183188" y="987425"/>
-            <a:ext cx="6172200" cy="4873625"/>
+            <a:off x="3887391" y="987426"/>
+            <a:ext cx="4629150" cy="4873625"/>
           </a:xfrm>
         </p:spPr>
         <p:txBody>
-          <a:bodyPr/>
+          <a:bodyPr anchor="t"/>
           <a:lstStyle>
             <a:lvl1pPr marL="0" indent="0">
               <a:buNone/>
@@ -2993,13 +2836,17 @@
             </a:lvl9pPr>
           </a:lstStyle>
           <a:p>
-            <a:endParaRPr lang="pt-BR"/>
-          </a:p>
-        </p:txBody>
-      </p:sp>
-      <p:sp>
-        <p:nvSpPr>
-          <p:cNvPr id="4" name="Espaço Reservado para Texto 3"/>
+            <a:r>
+              <a:rPr lang="pt-BR" smtClean="0"/>
+              <a:t>Clique no ícone para adicionar uma imagem</a:t>
+            </a:r>
+            <a:endParaRPr lang="en-US" dirty="0"/>
+          </a:p>
+        </p:txBody>
+      </p:sp>
+      <p:sp>
+        <p:nvSpPr>
+          <p:cNvPr id="4" name="Text Placeholder 3"/>
           <p:cNvSpPr>
             <a:spLocks noGrp="1"/>
           </p:cNvSpPr>
@@ -3009,8 +2856,8 @@
         </p:nvSpPr>
         <p:spPr>
           <a:xfrm>
-            <a:off x="839788" y="2057400"/>
-            <a:ext cx="3932237" cy="3811588"/>
+            <a:off x="629841" y="2057400"/>
+            <a:ext cx="2949178" cy="3811588"/>
           </a:xfrm>
         </p:spPr>
         <p:txBody>
@@ -3064,7 +2911,7 @@
       </p:sp>
       <p:sp>
         <p:nvSpPr>
-          <p:cNvPr id="5" name="Espaço Reservado para Data 4"/>
+          <p:cNvPr id="5" name="Date Placeholder 4"/>
           <p:cNvSpPr>
             <a:spLocks noGrp="1"/>
           </p:cNvSpPr>
@@ -3079,7 +2926,7 @@
           <a:p>
             <a:fld id="{8A5E5921-9CEC-4050-BEC1-20181F0949A3}" type="datetime1">
               <a:rPr lang="pt-BR" smtClean="0"/>
-              <a:t>27/05/2014</a:t>
+              <a:t>28/05/2014</a:t>
             </a:fld>
             <a:endParaRPr lang="pt-BR"/>
           </a:p>
@@ -3087,7 +2934,7 @@
       </p:sp>
       <p:sp>
         <p:nvSpPr>
-          <p:cNvPr id="6" name="Espaço Reservado para Rodapé 5"/>
+          <p:cNvPr id="6" name="Footer Placeholder 5"/>
           <p:cNvSpPr>
             <a:spLocks noGrp="1"/>
           </p:cNvSpPr>
@@ -3110,7 +2957,7 @@
       </p:sp>
       <p:sp>
         <p:nvSpPr>
-          <p:cNvPr id="7" name="Espaço Reservado para Número de Slide 6"/>
+          <p:cNvPr id="7" name="Slide Number Placeholder 6"/>
           <p:cNvSpPr>
             <a:spLocks noGrp="1"/>
           </p:cNvSpPr>
@@ -3134,7 +2981,7 @@
     </p:spTree>
     <p:extLst>
       <p:ext uri="{BB962C8B-B14F-4D97-AF65-F5344CB8AC3E}">
-        <p14:creationId xmlns:p14="http://schemas.microsoft.com/office/powerpoint/2010/main" val="377059767"/>
+        <p14:creationId xmlns:p14="http://schemas.microsoft.com/office/powerpoint/2010/main" val="781640540"/>
       </p:ext>
     </p:extLst>
   </p:cSld>
@@ -3168,7 +3015,7 @@
       </p:grpSpPr>
       <p:sp>
         <p:nvSpPr>
-          <p:cNvPr id="2" name="Espaço Reservado para Título 1"/>
+          <p:cNvPr id="2" name="Title Placeholder 1"/>
           <p:cNvSpPr>
             <a:spLocks noGrp="1"/>
           </p:cNvSpPr>
@@ -3178,8 +3025,8 @@
         </p:nvSpPr>
         <p:spPr>
           <a:xfrm>
-            <a:off x="838200" y="365125"/>
-            <a:ext cx="10515600" cy="1325563"/>
+            <a:off x="628650" y="365126"/>
+            <a:ext cx="7886700" cy="1325563"/>
           </a:xfrm>
           <a:prstGeom prst="rect">
             <a:avLst/>
@@ -3195,13 +3042,13 @@
               <a:rPr lang="pt-BR" smtClean="0"/>
               <a:t>Clique para editar o título mestre</a:t>
             </a:r>
-            <a:endParaRPr lang="pt-BR"/>
-          </a:p>
-        </p:txBody>
-      </p:sp>
-      <p:sp>
-        <p:nvSpPr>
-          <p:cNvPr id="3" name="Espaço Reservado para Texto 2"/>
+            <a:endParaRPr lang="en-US" dirty="0"/>
+          </a:p>
+        </p:txBody>
+      </p:sp>
+      <p:sp>
+        <p:nvSpPr>
+          <p:cNvPr id="3" name="Text Placeholder 2"/>
           <p:cNvSpPr>
             <a:spLocks noGrp="1"/>
           </p:cNvSpPr>
@@ -3211,8 +3058,8 @@
         </p:nvSpPr>
         <p:spPr>
           <a:xfrm>
-            <a:off x="838200" y="1825625"/>
-            <a:ext cx="10515600" cy="4351338"/>
+            <a:off x="628650" y="1825625"/>
+            <a:ext cx="7886700" cy="4351338"/>
           </a:xfrm>
           <a:prstGeom prst="rect">
             <a:avLst/>
@@ -3257,13 +3104,13 @@
               <a:rPr lang="pt-BR" smtClean="0"/>
               <a:t>Quinto nível</a:t>
             </a:r>
-            <a:endParaRPr lang="pt-BR"/>
-          </a:p>
-        </p:txBody>
-      </p:sp>
-      <p:sp>
-        <p:nvSpPr>
-          <p:cNvPr id="4" name="Espaço Reservado para Data 3"/>
+            <a:endParaRPr lang="en-US" dirty="0"/>
+          </a:p>
+        </p:txBody>
+      </p:sp>
+      <p:sp>
+        <p:nvSpPr>
+          <p:cNvPr id="4" name="Date Placeholder 3"/>
           <p:cNvSpPr>
             <a:spLocks noGrp="1"/>
           </p:cNvSpPr>
@@ -3273,8 +3120,8 @@
         </p:nvSpPr>
         <p:spPr>
           <a:xfrm>
-            <a:off x="838200" y="6356350"/>
-            <a:ext cx="2743200" cy="365125"/>
+            <a:off x="628650" y="6356351"/>
+            <a:ext cx="2057400" cy="365125"/>
           </a:xfrm>
           <a:prstGeom prst="rect">
             <a:avLst/>
@@ -3296,7 +3143,7 @@
           <a:p>
             <a:fld id="{317250D5-F4D3-4996-83F2-E63CAE78953C}" type="datetime1">
               <a:rPr lang="pt-BR" smtClean="0"/>
-              <a:t>27/05/2014</a:t>
+              <a:t>28/05/2014</a:t>
             </a:fld>
             <a:endParaRPr lang="pt-BR"/>
           </a:p>
@@ -3304,7 +3151,7 @@
       </p:sp>
       <p:sp>
         <p:nvSpPr>
-          <p:cNvPr id="5" name="Espaço Reservado para Rodapé 4"/>
+          <p:cNvPr id="5" name="Footer Placeholder 4"/>
           <p:cNvSpPr>
             <a:spLocks noGrp="1"/>
           </p:cNvSpPr>
@@ -3314,8 +3161,8 @@
         </p:nvSpPr>
         <p:spPr>
           <a:xfrm>
-            <a:off x="4038600" y="6356350"/>
-            <a:ext cx="4114800" cy="365125"/>
+            <a:off x="3028950" y="6356351"/>
+            <a:ext cx="3086100" cy="365125"/>
           </a:xfrm>
           <a:prstGeom prst="rect">
             <a:avLst/>
@@ -3345,7 +3192,7 @@
       </p:sp>
       <p:sp>
         <p:nvSpPr>
-          <p:cNvPr id="6" name="Espaço Reservado para Número de Slide 5"/>
+          <p:cNvPr id="6" name="Slide Number Placeholder 5"/>
           <p:cNvSpPr>
             <a:spLocks noGrp="1"/>
           </p:cNvSpPr>
@@ -3355,8 +3202,8 @@
         </p:nvSpPr>
         <p:spPr>
           <a:xfrm>
-            <a:off x="8610600" y="6356350"/>
-            <a:ext cx="2743200" cy="365125"/>
+            <a:off x="6457950" y="6356351"/>
+            <a:ext cx="2057400" cy="365125"/>
           </a:xfrm>
           <a:prstGeom prst="rect">
             <a:avLst/>
@@ -3387,23 +3234,23 @@
     </p:spTree>
     <p:extLst>
       <p:ext uri="{BB962C8B-B14F-4D97-AF65-F5344CB8AC3E}">
-        <p14:creationId xmlns:p14="http://schemas.microsoft.com/office/powerpoint/2010/main" val="2048302607"/>
+        <p14:creationId xmlns:p14="http://schemas.microsoft.com/office/powerpoint/2010/main" val="2057706113"/>
       </p:ext>
     </p:extLst>
   </p:cSld>
   <p:clrMap bg1="lt1" tx1="dk1" bg2="lt2" tx2="dk2" accent1="accent1" accent2="accent2" accent3="accent3" accent4="accent4" accent5="accent5" accent6="accent6" hlink="hlink" folHlink="folHlink"/>
   <p:sldLayoutIdLst>
-    <p:sldLayoutId id="2147483697" r:id="rId1"/>
-    <p:sldLayoutId id="2147483698" r:id="rId2"/>
-    <p:sldLayoutId id="2147483699" r:id="rId3"/>
-    <p:sldLayoutId id="2147483700" r:id="rId4"/>
-    <p:sldLayoutId id="2147483701" r:id="rId5"/>
-    <p:sldLayoutId id="2147483702" r:id="rId6"/>
-    <p:sldLayoutId id="2147483703" r:id="rId7"/>
-    <p:sldLayoutId id="2147483704" r:id="rId8"/>
-    <p:sldLayoutId id="2147483705" r:id="rId9"/>
-    <p:sldLayoutId id="2147483706" r:id="rId10"/>
-    <p:sldLayoutId id="2147483707" r:id="rId11"/>
+    <p:sldLayoutId id="2147483709" r:id="rId1"/>
+    <p:sldLayoutId id="2147483710" r:id="rId2"/>
+    <p:sldLayoutId id="2147483711" r:id="rId3"/>
+    <p:sldLayoutId id="2147483712" r:id="rId4"/>
+    <p:sldLayoutId id="2147483713" r:id="rId5"/>
+    <p:sldLayoutId id="2147483714" r:id="rId6"/>
+    <p:sldLayoutId id="2147483715" r:id="rId7"/>
+    <p:sldLayoutId id="2147483716" r:id="rId8"/>
+    <p:sldLayoutId id="2147483717" r:id="rId9"/>
+    <p:sldLayoutId id="2147483718" r:id="rId10"/>
+    <p:sldLayoutId id="2147483719" r:id="rId11"/>
   </p:sldLayoutIdLst>
   <p:hf hdr="0"/>
   <p:txStyles>
@@ -3592,7 +3439,7 @@
     </p:bodyStyle>
     <p:otherStyle>
       <a:defPPr>
-        <a:defRPr lang="pt-BR"/>
+        <a:defRPr lang="en-US"/>
       </a:defPPr>
       <a:lvl1pPr marL="0" algn="l" defTabSz="914400" rtl="0" eaLnBrk="1" latinLnBrk="0" hangingPunct="1">
         <a:defRPr sz="1800" kern="1200">
@@ -3728,8 +3575,8 @@
         </p:blipFill>
         <p:spPr>
           <a:xfrm>
-            <a:off x="761" y="428"/>
-            <a:ext cx="12191239" cy="6857572"/>
+            <a:off x="571" y="0"/>
+            <a:ext cx="9143429" cy="6857999"/>
           </a:xfrm>
           <a:prstGeom prst="rect">
             <a:avLst/>
@@ -3746,16 +3593,16 @@
         </p:nvSpPr>
         <p:spPr>
           <a:xfrm>
-            <a:off x="3630550" y="681041"/>
-            <a:ext cx="7772399" cy="2331935"/>
+            <a:off x="2722913" y="1368031"/>
+            <a:ext cx="5829299" cy="1748951"/>
           </a:xfrm>
           <a:prstGeom prst="rect">
             <a:avLst/>
           </a:prstGeom>
         </p:spPr>
         <p:txBody>
-          <a:bodyPr vert="horz" lIns="91440" tIns="45720" rIns="91440" bIns="45720" rtlCol="0" anchor="ctr">
-            <a:normAutofit/>
+          <a:bodyPr vert="horz" lIns="68580" tIns="34290" rIns="68580" bIns="34290" rtlCol="0" anchor="ctr">
+            <a:normAutofit lnSpcReduction="10000"/>
           </a:bodyPr>
           <a:lstStyle>
             <a:lvl1pPr algn="r" defTabSz="914400" rtl="0" eaLnBrk="1" latinLnBrk="0" hangingPunct="1">
@@ -3782,12 +3629,12 @@
           <a:p>
             <a:pPr algn="just"/>
             <a:r>
-              <a:rPr lang="pt-BR" b="1" dirty="0" smtClean="0">
+              <a:rPr lang="pt-BR" sz="3750" b="1" dirty="0">
                 <a:latin typeface="Eras Light ITC" panose="020B0402030504020804" pitchFamily="34" charset="0"/>
               </a:rPr>
               <a:t>Desenvolvimento de um Microprocessador 8086 RISC</a:t>
             </a:r>
-            <a:endParaRPr lang="pt-BR" b="1" dirty="0">
+            <a:endParaRPr lang="pt-BR" sz="3750" b="1" dirty="0">
               <a:latin typeface="Eras Light ITC" panose="020B0402030504020804" pitchFamily="34" charset="0"/>
             </a:endParaRPr>
           </a:p>
@@ -3803,15 +3650,15 @@
         </p:nvSpPr>
         <p:spPr>
           <a:xfrm>
-            <a:off x="5903873" y="5545454"/>
-            <a:ext cx="4094367" cy="1463040"/>
+            <a:off x="4427905" y="5016341"/>
+            <a:ext cx="3070775" cy="1097280"/>
           </a:xfrm>
           <a:prstGeom prst="rect">
             <a:avLst/>
           </a:prstGeom>
         </p:spPr>
         <p:txBody>
-          <a:bodyPr vert="horz" lIns="91440" tIns="45720" rIns="91440" bIns="45720" rtlCol="0" anchor="ctr">
+          <a:bodyPr vert="horz" lIns="68580" tIns="34290" rIns="68580" bIns="34290" rtlCol="0" anchor="ctr">
             <a:normAutofit/>
           </a:bodyPr>
           <a:lstStyle>
@@ -4039,7 +3886,7 @@
           <a:p>
             <a:pPr algn="ctr"/>
             <a:r>
-              <a:rPr lang="pt-BR" b="1" dirty="0" smtClean="0">
+              <a:rPr lang="pt-BR" sz="1350" b="1" dirty="0">
                 <a:latin typeface="Arial" panose="020B0604020202020204" pitchFamily="34" charset="0"/>
                 <a:cs typeface="Arial" panose="020B0604020202020204" pitchFamily="34" charset="0"/>
               </a:rPr>
@@ -4049,13 +3896,13 @@
           <a:p>
             <a:pPr algn="ctr"/>
             <a:r>
-              <a:rPr lang="pt-BR" b="1" dirty="0" smtClean="0">
+              <a:rPr lang="pt-BR" sz="1350" b="1" dirty="0">
                 <a:latin typeface="Arial" panose="020B0604020202020204" pitchFamily="34" charset="0"/>
                 <a:cs typeface="Arial" panose="020B0604020202020204" pitchFamily="34" charset="0"/>
               </a:rPr>
               <a:t>Universidade Federal de Itajubá</a:t>
             </a:r>
-            <a:endParaRPr lang="pt-BR" b="1" dirty="0">
+            <a:endParaRPr lang="pt-BR" sz="1350" b="1" dirty="0">
               <a:latin typeface="Arial" panose="020B0604020202020204" pitchFamily="34" charset="0"/>
               <a:cs typeface="Arial" panose="020B0604020202020204" pitchFamily="34" charset="0"/>
             </a:endParaRPr>
@@ -4070,8 +3917,8 @@
         </p:nvSpPr>
         <p:spPr>
           <a:xfrm>
-            <a:off x="7024826" y="4029339"/>
-            <a:ext cx="4378123" cy="646331"/>
+            <a:off x="5222453" y="3879255"/>
+            <a:ext cx="3329759" cy="507831"/>
           </a:xfrm>
           <a:prstGeom prst="rect">
             <a:avLst/>
@@ -4086,7 +3933,7 @@
           <a:p>
             <a:pPr algn="r"/>
             <a:r>
-              <a:rPr lang="pt-BR" dirty="0" smtClean="0">
+              <a:rPr lang="pt-BR" sz="1350" dirty="0">
                 <a:latin typeface="Arial Unicode MS" panose="020B0604020202020204" pitchFamily="34" charset="-128"/>
                 <a:ea typeface="Arial Unicode MS" panose="020B0604020202020204" pitchFamily="34" charset="-128"/>
                 <a:cs typeface="Arial Unicode MS" panose="020B0604020202020204" pitchFamily="34" charset="-128"/>
@@ -4097,14 +3944,14 @@
           <a:p>
             <a:pPr algn="r"/>
             <a:r>
-              <a:rPr lang="pt-BR" dirty="0" smtClean="0">
+              <a:rPr lang="pt-BR" sz="1350" dirty="0">
                 <a:latin typeface="Arial Unicode MS" panose="020B0604020202020204" pitchFamily="34" charset="-128"/>
                 <a:ea typeface="Arial Unicode MS" panose="020B0604020202020204" pitchFamily="34" charset="-128"/>
                 <a:cs typeface="Arial Unicode MS" panose="020B0604020202020204" pitchFamily="34" charset="-128"/>
               </a:rPr>
               <a:t>Marcos Aurélio Freitas de Almeida Costa</a:t>
             </a:r>
-            <a:endParaRPr lang="pt-BR" dirty="0">
+            <a:endParaRPr lang="pt-BR" sz="1350" dirty="0">
               <a:latin typeface="Arial Unicode MS" panose="020B0604020202020204" pitchFamily="34" charset="-128"/>
               <a:ea typeface="Arial Unicode MS" panose="020B0604020202020204" pitchFamily="34" charset="-128"/>
               <a:cs typeface="Arial Unicode MS" panose="020B0604020202020204" pitchFamily="34" charset="-128"/>
@@ -4149,20 +3996,50 @@
           <a:chExt cx="0" cy="0"/>
         </a:xfrm>
       </p:grpSpPr>
-      <p:sp>
-        <p:nvSpPr>
-          <p:cNvPr id="2" name="Título 1"/>
-          <p:cNvSpPr>
-            <a:spLocks noGrp="1"/>
-          </p:cNvSpPr>
-          <p:nvPr>
-            <p:ph type="title"/>
-          </p:nvPr>
-        </p:nvSpPr>
+      <p:pic>
+        <p:nvPicPr>
+          <p:cNvPr id="4" name="Imagem 3"/>
+          <p:cNvPicPr>
+            <a:picLocks noChangeAspect="1"/>
+          </p:cNvPicPr>
+          <p:nvPr/>
+        </p:nvPicPr>
+        <p:blipFill>
+          <a:blip r:embed="rId3">
+            <a:extLst>
+              <a:ext uri="{28A0092B-C50C-407E-A947-70E740481C1C}">
+                <a14:useLocalDpi xmlns:a14="http://schemas.microsoft.com/office/drawing/2010/main" val="0"/>
+              </a:ext>
+            </a:extLst>
+          </a:blip>
+          <a:stretch>
+            <a:fillRect/>
+          </a:stretch>
+        </p:blipFill>
         <p:spPr>
           <a:xfrm>
-            <a:off x="838200" y="304968"/>
-            <a:ext cx="10515600" cy="453022"/>
+            <a:off x="0" y="0"/>
+            <a:ext cx="9144000" cy="6858000"/>
+          </a:xfrm>
+          <a:prstGeom prst="rect">
+            <a:avLst/>
+          </a:prstGeom>
+        </p:spPr>
+      </p:pic>
+      <p:sp>
+        <p:nvSpPr>
+          <p:cNvPr id="2" name="Título 1"/>
+          <p:cNvSpPr>
+            <a:spLocks noGrp="1"/>
+          </p:cNvSpPr>
+          <p:nvPr>
+            <p:ph type="title"/>
+          </p:nvPr>
+        </p:nvSpPr>
+        <p:spPr>
+          <a:xfrm>
+            <a:off x="628650" y="1085976"/>
+            <a:ext cx="7886700" cy="339767"/>
           </a:xfrm>
         </p:spPr>
         <p:txBody>
@@ -4173,7 +4050,7 @@
           <a:p>
             <a:r>
               <a:rPr lang="pt-BR" dirty="0" smtClean="0"/>
-              <a:t>Introdução</a:t>
+              <a:t>Resultados</a:t>
             </a:r>
             <a:endParaRPr lang="pt-BR" dirty="0"/>
           </a:p>
@@ -4191,8 +4068,8 @@
         </p:nvSpPr>
         <p:spPr>
           <a:xfrm>
-            <a:off x="838200" y="1634668"/>
-            <a:ext cx="10515600" cy="4351338"/>
+            <a:off x="628650" y="2455975"/>
+            <a:ext cx="7886700" cy="3263504"/>
           </a:xfrm>
         </p:spPr>
         <p:txBody>
@@ -4210,8 +4087,9 @@
             </a:pPr>
             <a:r>
               <a:rPr lang="pt-BR" dirty="0" smtClean="0"/>
-              <a:t>Texto</a:t>
-            </a:r>
+              <a:t>Estrutura de Testes</a:t>
+            </a:r>
+            <a:endParaRPr lang="pt-BR" dirty="0" smtClean="0"/>
           </a:p>
           <a:p>
             <a:pPr>
@@ -4225,8 +4103,9 @@
             </a:pPr>
             <a:r>
               <a:rPr lang="pt-BR" dirty="0" smtClean="0"/>
-              <a:t>Texto</a:t>
-            </a:r>
+              <a:t>O Microprocessador Desenvolvido</a:t>
+            </a:r>
+            <a:endParaRPr lang="pt-BR" dirty="0" smtClean="0"/>
           </a:p>
           <a:p>
             <a:pPr>
@@ -4240,84 +4119,81 @@
             </a:pPr>
             <a:r>
               <a:rPr lang="pt-BR" dirty="0" smtClean="0"/>
-              <a:t>Texto</a:t>
-            </a:r>
-          </a:p>
-          <a:p>
-            <a:pPr>
-              <a:buClr>
-                <a:schemeClr val="accent1">
-                  <a:lumMod val="75000"/>
-                </a:schemeClr>
-              </a:buClr>
-              <a:buFont typeface="Wingdings" panose="05000000000000000000" pitchFamily="2" charset="2"/>
-              <a:buChar char="q"/>
-            </a:pPr>
-            <a:r>
-              <a:rPr lang="pt-BR" dirty="0" smtClean="0"/>
-              <a:t>Texto</a:t>
-            </a:r>
-            <a:endParaRPr lang="pt-BR" dirty="0"/>
-          </a:p>
-        </p:txBody>
-      </p:sp>
-      <p:graphicFrame>
-        <p:nvGraphicFramePr>
-          <p:cNvPr id="7" name="Objeto 6"/>
-          <p:cNvGraphicFramePr>
-            <a:graphicFrameLocks noChangeAspect="1"/>
-          </p:cNvGraphicFramePr>
-          <p:nvPr>
-            <p:extLst>
-              <p:ext uri="{D42A27DB-BD31-4B8C-83A1-F6EECF244321}">
-                <p14:modId xmlns:p14="http://schemas.microsoft.com/office/powerpoint/2010/main" val="1993283754"/>
-              </p:ext>
-            </p:extLst>
-          </p:nvPr>
-        </p:nvGraphicFramePr>
-        <p:xfrm>
-          <a:off x="1588" y="6718300"/>
-          <a:ext cx="12190412" cy="139700"/>
-        </p:xfrm>
-        <a:graphic>
-          <a:graphicData uri="http://schemas.openxmlformats.org/presentationml/2006/ole">
-            <mc:AlternateContent xmlns:mc="http://schemas.openxmlformats.org/markup-compatibility/2006">
-              <mc:Choice xmlns:v="urn:schemas-microsoft-com:vml" Requires="v">
-                <p:oleObj spid="_x0000_s1030" name="Image" r:id="rId4" imgW="12190320" imgH="139680" progId="Photoshop.Image.13">
-                  <p:embed/>
-                </p:oleObj>
-              </mc:Choice>
-              <mc:Fallback>
-                <p:oleObj name="Image" r:id="rId4" imgW="12190320" imgH="139680" progId="Photoshop.Image.13">
-                  <p:embed/>
-                  <p:pic>
-                    <p:nvPicPr>
-                      <p:cNvPr id="0" name=""/>
-                      <p:cNvPicPr/>
-                      <p:nvPr/>
-                    </p:nvPicPr>
-                    <p:blipFill>
-                      <a:blip r:embed="rId5"/>
-                      <a:stretch>
-                        <a:fillRect/>
-                      </a:stretch>
-                    </p:blipFill>
-                    <p:spPr>
-                      <a:xfrm>
-                        <a:off x="1588" y="6718300"/>
-                        <a:ext cx="12190412" cy="139700"/>
-                      </a:xfrm>
-                      <a:prstGeom prst="rect">
-                        <a:avLst/>
-                      </a:prstGeom>
-                    </p:spPr>
-                  </p:pic>
-                </p:oleObj>
-              </mc:Fallback>
-            </mc:AlternateContent>
-          </a:graphicData>
-        </a:graphic>
-      </p:graphicFrame>
+              <a:t>Teste de cada instrução implementada</a:t>
+            </a:r>
+            <a:endParaRPr lang="pt-BR" dirty="0" smtClean="0"/>
+          </a:p>
+        </p:txBody>
+      </p:sp>
+      <p:sp>
+        <p:nvSpPr>
+          <p:cNvPr id="11" name="Espaço Reservado para Data 10"/>
+          <p:cNvSpPr>
+            <a:spLocks noGrp="1"/>
+          </p:cNvSpPr>
+          <p:nvPr>
+            <p:ph type="dt" sz="half" idx="10"/>
+          </p:nvPr>
+        </p:nvSpPr>
+        <p:spPr/>
+        <p:txBody>
+          <a:bodyPr/>
+          <a:lstStyle/>
+          <a:p>
+            <a:fld id="{5B2C3F26-301F-434E-863D-B89F544B9CE4}" type="datetime1">
+              <a:rPr lang="pt-BR" smtClean="0"/>
+              <a:t>28/05/2014</a:t>
+            </a:fld>
+            <a:endParaRPr lang="pt-BR"/>
+          </a:p>
+        </p:txBody>
+      </p:sp>
+      <p:sp>
+        <p:nvSpPr>
+          <p:cNvPr id="13" name="Espaço Reservado para Rodapé 12"/>
+          <p:cNvSpPr>
+            <a:spLocks noGrp="1"/>
+          </p:cNvSpPr>
+          <p:nvPr>
+            <p:ph type="ftr" sz="quarter" idx="11"/>
+          </p:nvPr>
+        </p:nvSpPr>
+        <p:spPr/>
+        <p:txBody>
+          <a:bodyPr/>
+          <a:lstStyle/>
+          <a:p>
+            <a:r>
+              <a:rPr lang="pt-BR" smtClean="0"/>
+              <a:t>Universidade Federal de Itajubá</a:t>
+            </a:r>
+            <a:endParaRPr lang="pt-BR"/>
+          </a:p>
+        </p:txBody>
+      </p:sp>
+      <p:sp>
+        <p:nvSpPr>
+          <p:cNvPr id="12" name="Espaço Reservado para Número de Slide 11"/>
+          <p:cNvSpPr>
+            <a:spLocks noGrp="1"/>
+          </p:cNvSpPr>
+          <p:nvPr>
+            <p:ph type="sldNum" sz="quarter" idx="12"/>
+          </p:nvPr>
+        </p:nvSpPr>
+        <p:spPr/>
+        <p:txBody>
+          <a:bodyPr/>
+          <a:lstStyle/>
+          <a:p>
+            <a:fld id="{31892884-0934-4F3F-B79B-36C387EDB149}" type="slidenum">
+              <a:rPr lang="pt-BR" smtClean="0"/>
+              <a:t>2</a:t>
+            </a:fld>
+            <a:endParaRPr lang="pt-BR"/>
+          </a:p>
+        </p:txBody>
+      </p:sp>
       <p:cxnSp>
         <p:nvCxnSpPr>
           <p:cNvPr id="9" name="Conector reto 8"/>
@@ -4326,8 +4202,8 @@
         </p:nvCxnSpPr>
         <p:spPr>
           <a:xfrm>
-            <a:off x="445168" y="902374"/>
-            <a:ext cx="6545179" cy="0"/>
+            <a:off x="333877" y="1534031"/>
+            <a:ext cx="4908884" cy="0"/>
           </a:xfrm>
           <a:prstGeom prst="line">
             <a:avLst/>
@@ -4349,75 +4225,6 @@
           </a:fontRef>
         </p:style>
       </p:cxnSp>
-      <p:sp>
-        <p:nvSpPr>
-          <p:cNvPr id="11" name="Espaço Reservado para Data 10"/>
-          <p:cNvSpPr>
-            <a:spLocks noGrp="1"/>
-          </p:cNvSpPr>
-          <p:nvPr>
-            <p:ph type="dt" sz="half" idx="10"/>
-          </p:nvPr>
-        </p:nvSpPr>
-        <p:spPr/>
-        <p:txBody>
-          <a:bodyPr/>
-          <a:lstStyle/>
-          <a:p>
-            <a:fld id="{5B2C3F26-301F-434E-863D-B89F544B9CE4}" type="datetime1">
-              <a:rPr lang="pt-BR" smtClean="0"/>
-              <a:t>27/05/2014</a:t>
-            </a:fld>
-            <a:endParaRPr lang="pt-BR"/>
-          </a:p>
-        </p:txBody>
-      </p:sp>
-      <p:sp>
-        <p:nvSpPr>
-          <p:cNvPr id="12" name="Espaço Reservado para Número de Slide 11"/>
-          <p:cNvSpPr>
-            <a:spLocks noGrp="1"/>
-          </p:cNvSpPr>
-          <p:nvPr>
-            <p:ph type="sldNum" sz="quarter" idx="12"/>
-          </p:nvPr>
-        </p:nvSpPr>
-        <p:spPr/>
-        <p:txBody>
-          <a:bodyPr/>
-          <a:lstStyle/>
-          <a:p>
-            <a:fld id="{31892884-0934-4F3F-B79B-36C387EDB149}" type="slidenum">
-              <a:rPr lang="pt-BR" smtClean="0"/>
-              <a:t>2</a:t>
-            </a:fld>
-            <a:endParaRPr lang="pt-BR"/>
-          </a:p>
-        </p:txBody>
-      </p:sp>
-      <p:sp>
-        <p:nvSpPr>
-          <p:cNvPr id="13" name="Espaço Reservado para Rodapé 12"/>
-          <p:cNvSpPr>
-            <a:spLocks noGrp="1"/>
-          </p:cNvSpPr>
-          <p:nvPr>
-            <p:ph type="ftr" sz="quarter" idx="11"/>
-          </p:nvPr>
-        </p:nvSpPr>
-        <p:spPr/>
-        <p:txBody>
-          <a:bodyPr/>
-          <a:lstStyle/>
-          <a:p>
-            <a:r>
-              <a:rPr lang="pt-BR" smtClean="0"/>
-              <a:t>Universidade Federal de Itajubá</a:t>
-            </a:r>
-            <a:endParaRPr lang="pt-BR"/>
-          </a:p>
-        </p:txBody>
-      </p:sp>
     </p:spTree>
     <p:extLst>
       <p:ext uri="{BB962C8B-B14F-4D97-AF65-F5344CB8AC3E}">
@@ -4429,15 +4236,11 @@
     <a:masterClrMapping/>
   </p:clrMapOvr>
   <mc:AlternateContent xmlns:mc="http://schemas.openxmlformats.org/markup-compatibility/2006">
-    <mc:Choice xmlns:p15="http://schemas.microsoft.com/office/powerpoint/2012/main" Requires="p15">
-      <p:transition xmlns:p14="http://schemas.microsoft.com/office/powerpoint/2010/main" spd="slow" p14:dur="6000">
-        <p15:prstTrans prst="curtains"/>
-      </p:transition>
+    <mc:Choice xmlns:p14="http://schemas.microsoft.com/office/powerpoint/2010/main" Requires="p14">
+      <p:transition p14:dur="0"/>
     </mc:Choice>
     <mc:Fallback>
-      <p:transition spd="slow">
-        <p:fade/>
-      </p:transition>
+      <p:transition/>
     </mc:Fallback>
   </mc:AlternateContent>
   <p:timing>
@@ -4467,20 +4270,50 @@
           <a:chExt cx="0" cy="0"/>
         </a:xfrm>
       </p:grpSpPr>
-      <p:sp>
-        <p:nvSpPr>
-          <p:cNvPr id="2" name="Título 1"/>
-          <p:cNvSpPr>
-            <a:spLocks noGrp="1"/>
-          </p:cNvSpPr>
-          <p:nvPr>
-            <p:ph type="title"/>
-          </p:nvPr>
-        </p:nvSpPr>
+      <p:pic>
+        <p:nvPicPr>
+          <p:cNvPr id="4" name="Imagem 3"/>
+          <p:cNvPicPr>
+            <a:picLocks noChangeAspect="1"/>
+          </p:cNvPicPr>
+          <p:nvPr/>
+        </p:nvPicPr>
+        <p:blipFill>
+          <a:blip r:embed="rId3">
+            <a:extLst>
+              <a:ext uri="{28A0092B-C50C-407E-A947-70E740481C1C}">
+                <a14:useLocalDpi xmlns:a14="http://schemas.microsoft.com/office/drawing/2010/main" val="0"/>
+              </a:ext>
+            </a:extLst>
+          </a:blip>
+          <a:stretch>
+            <a:fillRect/>
+          </a:stretch>
+        </p:blipFill>
         <p:spPr>
           <a:xfrm>
-            <a:off x="838200" y="304968"/>
-            <a:ext cx="10515600" cy="453022"/>
+            <a:off x="0" y="0"/>
+            <a:ext cx="9144000" cy="6858000"/>
+          </a:xfrm>
+          <a:prstGeom prst="rect">
+            <a:avLst/>
+          </a:prstGeom>
+        </p:spPr>
+      </p:pic>
+      <p:sp>
+        <p:nvSpPr>
+          <p:cNvPr id="2" name="Título 1"/>
+          <p:cNvSpPr>
+            <a:spLocks noGrp="1"/>
+          </p:cNvSpPr>
+          <p:nvPr>
+            <p:ph type="title"/>
+          </p:nvPr>
+        </p:nvSpPr>
+        <p:spPr>
+          <a:xfrm>
+            <a:off x="628650" y="411913"/>
+            <a:ext cx="7886700" cy="339767"/>
           </a:xfrm>
         </p:spPr>
         <p:txBody>
@@ -4491,7 +4324,7 @@
           <a:p>
             <a:r>
               <a:rPr lang="pt-BR" dirty="0" smtClean="0"/>
-              <a:t>Texto 2</a:t>
+              <a:t>Resultados</a:t>
             </a:r>
             <a:endParaRPr lang="pt-BR" dirty="0"/>
           </a:p>
@@ -4499,143 +4332,73 @@
       </p:sp>
       <p:sp>
         <p:nvSpPr>
-          <p:cNvPr id="3" name="Espaço Reservado para Conteúdo 2"/>
-          <p:cNvSpPr>
-            <a:spLocks noGrp="1"/>
-          </p:cNvSpPr>
-          <p:nvPr>
-            <p:ph idx="1"/>
-          </p:nvPr>
-        </p:nvSpPr>
-        <p:spPr>
-          <a:xfrm>
-            <a:off x="838200" y="1634668"/>
-            <a:ext cx="10515600" cy="4351338"/>
-          </a:xfrm>
-        </p:spPr>
-        <p:txBody>
-          <a:bodyPr/>
-          <a:lstStyle/>
-          <a:p>
-            <a:pPr>
-              <a:buClr>
-                <a:schemeClr val="accent1">
-                  <a:lumMod val="75000"/>
-                </a:schemeClr>
-              </a:buClr>
-              <a:buFont typeface="Wingdings" panose="05000000000000000000" pitchFamily="2" charset="2"/>
-              <a:buChar char="q"/>
-            </a:pPr>
-            <a:r>
-              <a:rPr lang="pt-BR" dirty="0" smtClean="0"/>
-              <a:t>Texto</a:t>
-            </a:r>
-          </a:p>
-          <a:p>
-            <a:pPr>
-              <a:buClr>
-                <a:schemeClr val="accent1">
-                  <a:lumMod val="75000"/>
-                </a:schemeClr>
-              </a:buClr>
-              <a:buFont typeface="Wingdings" panose="05000000000000000000" pitchFamily="2" charset="2"/>
-              <a:buChar char="q"/>
-            </a:pPr>
-            <a:r>
-              <a:rPr lang="pt-BR" dirty="0" smtClean="0"/>
-              <a:t>Texto</a:t>
-            </a:r>
-          </a:p>
-          <a:p>
-            <a:pPr>
-              <a:buClr>
-                <a:schemeClr val="accent1">
-                  <a:lumMod val="75000"/>
-                </a:schemeClr>
-              </a:buClr>
-              <a:buFont typeface="Wingdings" panose="05000000000000000000" pitchFamily="2" charset="2"/>
-              <a:buChar char="q"/>
-            </a:pPr>
-            <a:r>
-              <a:rPr lang="pt-BR" dirty="0" smtClean="0"/>
-              <a:t>Texto</a:t>
-            </a:r>
-          </a:p>
-          <a:p>
-            <a:pPr>
-              <a:buClr>
-                <a:schemeClr val="accent1">
-                  <a:lumMod val="75000"/>
-                </a:schemeClr>
-              </a:buClr>
-              <a:buFont typeface="Wingdings" panose="05000000000000000000" pitchFamily="2" charset="2"/>
-              <a:buChar char="q"/>
-            </a:pPr>
-            <a:r>
-              <a:rPr lang="pt-BR" dirty="0" smtClean="0"/>
-              <a:t>Texto</a:t>
-            </a:r>
-            <a:endParaRPr lang="pt-BR" dirty="0"/>
-          </a:p>
-        </p:txBody>
-      </p:sp>
-      <p:graphicFrame>
-        <p:nvGraphicFramePr>
-          <p:cNvPr id="7" name="Objeto 6"/>
-          <p:cNvGraphicFramePr>
-            <a:graphicFrameLocks noChangeAspect="1"/>
-          </p:cNvGraphicFramePr>
-          <p:nvPr>
-            <p:extLst>
-              <p:ext uri="{D42A27DB-BD31-4B8C-83A1-F6EECF244321}">
-                <p14:modId xmlns:p14="http://schemas.microsoft.com/office/powerpoint/2010/main" val="1993283754"/>
-              </p:ext>
-            </p:extLst>
-          </p:nvPr>
-        </p:nvGraphicFramePr>
-        <p:xfrm>
-          <a:off x="1588" y="6718300"/>
-          <a:ext cx="12190412" cy="139700"/>
-        </p:xfrm>
-        <a:graphic>
-          <a:graphicData uri="http://schemas.openxmlformats.org/presentationml/2006/ole">
-            <mc:AlternateContent xmlns:mc="http://schemas.openxmlformats.org/markup-compatibility/2006">
-              <mc:Choice xmlns:v="urn:schemas-microsoft-com:vml" Requires="v">
-                <p:oleObj spid="_x0000_s2053" name="Image" r:id="rId4" imgW="12190320" imgH="139680" progId="Photoshop.Image.13">
-                  <p:embed/>
-                </p:oleObj>
-              </mc:Choice>
-              <mc:Fallback>
-                <p:oleObj name="Image" r:id="rId4" imgW="12190320" imgH="139680" progId="Photoshop.Image.13">
-                  <p:embed/>
-                  <p:pic>
-                    <p:nvPicPr>
-                      <p:cNvPr id="0" name=""/>
-                      <p:cNvPicPr/>
-                      <p:nvPr/>
-                    </p:nvPicPr>
-                    <p:blipFill>
-                      <a:blip r:embed="rId5"/>
-                      <a:stretch>
-                        <a:fillRect/>
-                      </a:stretch>
-                    </p:blipFill>
-                    <p:spPr>
-                      <a:xfrm>
-                        <a:off x="1588" y="6718300"/>
-                        <a:ext cx="12190412" cy="139700"/>
-                      </a:xfrm>
-                      <a:prstGeom prst="rect">
-                        <a:avLst/>
-                      </a:prstGeom>
-                    </p:spPr>
-                  </p:pic>
-                </p:oleObj>
-              </mc:Fallback>
-            </mc:AlternateContent>
-          </a:graphicData>
-        </a:graphic>
-      </p:graphicFrame>
+          <p:cNvPr id="11" name="Espaço Reservado para Data 10"/>
+          <p:cNvSpPr>
+            <a:spLocks noGrp="1"/>
+          </p:cNvSpPr>
+          <p:nvPr>
+            <p:ph type="dt" sz="half" idx="10"/>
+          </p:nvPr>
+        </p:nvSpPr>
+        <p:spPr/>
+        <p:txBody>
+          <a:bodyPr/>
+          <a:lstStyle/>
+          <a:p>
+            <a:fld id="{5B2C3F26-301F-434E-863D-B89F544B9CE4}" type="datetime1">
+              <a:rPr lang="pt-BR" smtClean="0"/>
+              <a:t>28/05/2014</a:t>
+            </a:fld>
+            <a:endParaRPr lang="pt-BR"/>
+          </a:p>
+        </p:txBody>
+      </p:sp>
+      <p:sp>
+        <p:nvSpPr>
+          <p:cNvPr id="13" name="Espaço Reservado para Rodapé 12"/>
+          <p:cNvSpPr>
+            <a:spLocks noGrp="1"/>
+          </p:cNvSpPr>
+          <p:nvPr>
+            <p:ph type="ftr" sz="quarter" idx="11"/>
+          </p:nvPr>
+        </p:nvSpPr>
+        <p:spPr/>
+        <p:txBody>
+          <a:bodyPr/>
+          <a:lstStyle/>
+          <a:p>
+            <a:r>
+              <a:rPr lang="pt-BR" smtClean="0"/>
+              <a:t>Universidade Federal de Itajubá</a:t>
+            </a:r>
+            <a:endParaRPr lang="pt-BR"/>
+          </a:p>
+        </p:txBody>
+      </p:sp>
+      <p:sp>
+        <p:nvSpPr>
+          <p:cNvPr id="12" name="Espaço Reservado para Número de Slide 11"/>
+          <p:cNvSpPr>
+            <a:spLocks noGrp="1"/>
+          </p:cNvSpPr>
+          <p:nvPr>
+            <p:ph type="sldNum" sz="quarter" idx="12"/>
+          </p:nvPr>
+        </p:nvSpPr>
+        <p:spPr/>
+        <p:txBody>
+          <a:bodyPr/>
+          <a:lstStyle/>
+          <a:p>
+            <a:fld id="{31892884-0934-4F3F-B79B-36C387EDB149}" type="slidenum">
+              <a:rPr lang="pt-BR" smtClean="0"/>
+              <a:t>3</a:t>
+            </a:fld>
+            <a:endParaRPr lang="pt-BR"/>
+          </a:p>
+        </p:txBody>
+      </p:sp>
       <p:cxnSp>
         <p:nvCxnSpPr>
           <p:cNvPr id="9" name="Conector reto 8"/>
@@ -4643,9 +4406,9 @@
           <p:nvPr/>
         </p:nvCxnSpPr>
         <p:spPr>
-          <a:xfrm>
-            <a:off x="445168" y="902374"/>
-            <a:ext cx="6545179" cy="0"/>
+          <a:xfrm flipV="1">
+            <a:off x="426444" y="914402"/>
+            <a:ext cx="8241038" cy="1445"/>
           </a:xfrm>
           <a:prstGeom prst="line">
             <a:avLst/>
@@ -4667,79 +4430,83 @@
           </a:fontRef>
         </p:style>
       </p:cxnSp>
-      <p:sp>
-        <p:nvSpPr>
-          <p:cNvPr id="11" name="Espaço Reservado para Data 10"/>
-          <p:cNvSpPr>
-            <a:spLocks noGrp="1"/>
-          </p:cNvSpPr>
-          <p:nvPr>
-            <p:ph type="dt" sz="half" idx="10"/>
-          </p:nvPr>
-        </p:nvSpPr>
-        <p:spPr/>
-        <p:txBody>
-          <a:bodyPr/>
-          <a:lstStyle/>
-          <a:p>
-            <a:fld id="{5B2C3F26-301F-434E-863D-B89F544B9CE4}" type="datetime1">
-              <a:rPr lang="pt-BR" smtClean="0"/>
-              <a:t>27/05/2014</a:t>
-            </a:fld>
-            <a:endParaRPr lang="pt-BR"/>
-          </a:p>
-        </p:txBody>
-      </p:sp>
-      <p:sp>
-        <p:nvSpPr>
-          <p:cNvPr id="12" name="Espaço Reservado para Número de Slide 11"/>
-          <p:cNvSpPr>
-            <a:spLocks noGrp="1"/>
-          </p:cNvSpPr>
-          <p:nvPr>
-            <p:ph type="sldNum" sz="quarter" idx="12"/>
-          </p:nvPr>
-        </p:nvSpPr>
-        <p:spPr/>
-        <p:txBody>
-          <a:bodyPr/>
-          <a:lstStyle/>
-          <a:p>
-            <a:fld id="{31892884-0934-4F3F-B79B-36C387EDB149}" type="slidenum">
-              <a:rPr lang="pt-BR" smtClean="0"/>
-              <a:t>3</a:t>
-            </a:fld>
-            <a:endParaRPr lang="pt-BR"/>
-          </a:p>
-        </p:txBody>
-      </p:sp>
-      <p:sp>
-        <p:nvSpPr>
-          <p:cNvPr id="13" name="Espaço Reservado para Rodapé 12"/>
-          <p:cNvSpPr>
-            <a:spLocks noGrp="1"/>
-          </p:cNvSpPr>
-          <p:nvPr>
-            <p:ph type="ftr" sz="quarter" idx="11"/>
-          </p:nvPr>
-        </p:nvSpPr>
-        <p:spPr/>
-        <p:txBody>
-          <a:bodyPr/>
-          <a:lstStyle/>
-          <a:p>
-            <a:r>
-              <a:rPr lang="pt-BR" smtClean="0"/>
-              <a:t>Universidade Federal de Itajubá</a:t>
-            </a:r>
-            <a:endParaRPr lang="pt-BR"/>
+      <p:pic>
+        <p:nvPicPr>
+          <p:cNvPr id="7" name="Espaço Reservado para Conteúdo 6"/>
+          <p:cNvPicPr>
+            <a:picLocks noGrp="1" noChangeAspect="1"/>
+          </p:cNvPicPr>
+          <p:nvPr>
+            <p:ph idx="1"/>
+          </p:nvPr>
+        </p:nvPicPr>
+        <p:blipFill>
+          <a:blip r:embed="rId4">
+            <a:extLst>
+              <a:ext uri="{28A0092B-C50C-407E-A947-70E740481C1C}">
+                <a14:useLocalDpi xmlns:a14="http://schemas.microsoft.com/office/drawing/2010/main" val="0"/>
+              </a:ext>
+            </a:extLst>
+          </a:blip>
+          <a:stretch>
+            <a:fillRect/>
+          </a:stretch>
+        </p:blipFill>
+        <p:spPr>
+          <a:xfrm>
+            <a:off x="628650" y="1579804"/>
+            <a:ext cx="7886700" cy="3585415"/>
+          </a:xfrm>
+          <a:prstGeom prst="rect">
+            <a:avLst/>
+          </a:prstGeom>
+          <a:ln>
+            <a:noFill/>
+          </a:ln>
+          <a:effectLst>
+            <a:outerShdw blurRad="292100" dist="139700" dir="2700000" algn="tl" rotWithShape="0">
+              <a:srgbClr val="333333">
+                <a:alpha val="65000"/>
+              </a:srgbClr>
+            </a:outerShdw>
+          </a:effectLst>
+        </p:spPr>
+      </p:pic>
+      <p:sp>
+        <p:nvSpPr>
+          <p:cNvPr id="8" name="CaixaDeTexto 7"/>
+          <p:cNvSpPr txBox="1"/>
+          <p:nvPr/>
+        </p:nvSpPr>
+        <p:spPr>
+          <a:xfrm>
+            <a:off x="628650" y="5323062"/>
+            <a:ext cx="7886700" cy="369332"/>
+          </a:xfrm>
+          <a:prstGeom prst="rect">
+            <a:avLst/>
+          </a:prstGeom>
+          <a:noFill/>
+        </p:spPr>
+        <p:txBody>
+          <a:bodyPr wrap="square" rtlCol="0">
+            <a:spAutoFit/>
+          </a:bodyPr>
+          <a:lstStyle/>
+          <a:p>
+            <a:pPr algn="ctr"/>
+            <a:r>
+              <a:rPr lang="pt-BR" i="1" dirty="0" smtClean="0"/>
+              <a:t>Figura X: Visão RTL da estrutura de testes</a:t>
+            </a:r>
+            <a:endParaRPr lang="pt-BR" i="1" dirty="0"/>
           </a:p>
         </p:txBody>
       </p:sp>
     </p:spTree>
     <p:extLst>
       <p:ext uri="{BB962C8B-B14F-4D97-AF65-F5344CB8AC3E}">
-        <p14:creationId xmlns:p14="http://schemas.microsoft.com/office/powerpoint/2010/main" val="1037745349"/>
+        <p14:creationId xmlns:p14="http://schemas.microsoft.com/office/powerpoint/2010/main" val="652386235"/>
       </p:ext>
     </p:extLst>
   </p:cSld>
@@ -4764,642 +4531,10 @@
 </p:sld>
 </file>
 
-<file path=ppt/slides/slide4.xml><?xml version="1.0" encoding="utf-8"?>
-<p:sld xmlns:a="http://schemas.openxmlformats.org/drawingml/2006/main" xmlns:r="http://schemas.openxmlformats.org/officeDocument/2006/relationships" xmlns:p="http://schemas.openxmlformats.org/presentationml/2006/main">
-  <p:cSld>
-    <p:spTree>
-      <p:nvGrpSpPr>
-        <p:cNvPr id="1" name=""/>
-        <p:cNvGrpSpPr/>
-        <p:nvPr/>
-      </p:nvGrpSpPr>
-      <p:grpSpPr>
-        <a:xfrm>
-          <a:off x="0" y="0"/>
-          <a:ext cx="0" cy="0"/>
-          <a:chOff x="0" y="0"/>
-          <a:chExt cx="0" cy="0"/>
-        </a:xfrm>
-      </p:grpSpPr>
-      <p:sp>
-        <p:nvSpPr>
-          <p:cNvPr id="2" name="Título 1"/>
-          <p:cNvSpPr>
-            <a:spLocks noGrp="1"/>
-          </p:cNvSpPr>
-          <p:nvPr>
-            <p:ph type="title"/>
-          </p:nvPr>
-        </p:nvSpPr>
-        <p:spPr>
-          <a:xfrm>
-            <a:off x="838200" y="304968"/>
-            <a:ext cx="10515600" cy="453022"/>
-          </a:xfrm>
-        </p:spPr>
-        <p:txBody>
-          <a:bodyPr>
-            <a:normAutofit fontScale="90000"/>
-          </a:bodyPr>
-          <a:lstStyle/>
-          <a:p>
-            <a:r>
-              <a:rPr lang="pt-BR" dirty="0" smtClean="0"/>
-              <a:t>Apresentar alguma ideia que não deu certo</a:t>
-            </a:r>
-            <a:endParaRPr lang="pt-BR" dirty="0"/>
-          </a:p>
-        </p:txBody>
-      </p:sp>
-      <p:sp>
-        <p:nvSpPr>
-          <p:cNvPr id="3" name="Espaço Reservado para Conteúdo 2"/>
-          <p:cNvSpPr>
-            <a:spLocks noGrp="1"/>
-          </p:cNvSpPr>
-          <p:nvPr>
-            <p:ph idx="1"/>
-          </p:nvPr>
-        </p:nvSpPr>
-        <p:spPr>
-          <a:xfrm>
-            <a:off x="838200" y="1634668"/>
-            <a:ext cx="10515600" cy="4351338"/>
-          </a:xfrm>
-        </p:spPr>
-        <p:txBody>
-          <a:bodyPr/>
-          <a:lstStyle/>
-          <a:p>
-            <a:pPr>
-              <a:buClr>
-                <a:schemeClr val="accent1">
-                  <a:lumMod val="75000"/>
-                </a:schemeClr>
-              </a:buClr>
-              <a:buFont typeface="Wingdings" panose="05000000000000000000" pitchFamily="2" charset="2"/>
-              <a:buChar char="q"/>
-            </a:pPr>
-            <a:r>
-              <a:rPr lang="pt-BR" dirty="0" smtClean="0"/>
-              <a:t>Texto</a:t>
-            </a:r>
-          </a:p>
-          <a:p>
-            <a:pPr>
-              <a:buClr>
-                <a:schemeClr val="accent1">
-                  <a:lumMod val="75000"/>
-                </a:schemeClr>
-              </a:buClr>
-              <a:buFont typeface="Wingdings" panose="05000000000000000000" pitchFamily="2" charset="2"/>
-              <a:buChar char="q"/>
-            </a:pPr>
-            <a:r>
-              <a:rPr lang="pt-BR" dirty="0" smtClean="0"/>
-              <a:t>Texto</a:t>
-            </a:r>
-          </a:p>
-          <a:p>
-            <a:pPr>
-              <a:buClr>
-                <a:schemeClr val="accent1">
-                  <a:lumMod val="75000"/>
-                </a:schemeClr>
-              </a:buClr>
-              <a:buFont typeface="Wingdings" panose="05000000000000000000" pitchFamily="2" charset="2"/>
-              <a:buChar char="q"/>
-            </a:pPr>
-            <a:r>
-              <a:rPr lang="pt-BR" dirty="0" smtClean="0"/>
-              <a:t>Texto</a:t>
-            </a:r>
-          </a:p>
-          <a:p>
-            <a:pPr>
-              <a:buClr>
-                <a:schemeClr val="accent1">
-                  <a:lumMod val="75000"/>
-                </a:schemeClr>
-              </a:buClr>
-              <a:buFont typeface="Wingdings" panose="05000000000000000000" pitchFamily="2" charset="2"/>
-              <a:buChar char="q"/>
-            </a:pPr>
-            <a:r>
-              <a:rPr lang="pt-BR" dirty="0" smtClean="0"/>
-              <a:t>Texto</a:t>
-            </a:r>
-            <a:endParaRPr lang="pt-BR" dirty="0"/>
-          </a:p>
-        </p:txBody>
-      </p:sp>
-      <p:graphicFrame>
-        <p:nvGraphicFramePr>
-          <p:cNvPr id="7" name="Objeto 6"/>
-          <p:cNvGraphicFramePr>
-            <a:graphicFrameLocks noChangeAspect="1"/>
-          </p:cNvGraphicFramePr>
-          <p:nvPr>
-            <p:extLst>
-              <p:ext uri="{D42A27DB-BD31-4B8C-83A1-F6EECF244321}">
-                <p14:modId xmlns:p14="http://schemas.microsoft.com/office/powerpoint/2010/main" val="1993283754"/>
-              </p:ext>
-            </p:extLst>
-          </p:nvPr>
-        </p:nvGraphicFramePr>
-        <p:xfrm>
-          <a:off x="1588" y="6718300"/>
-          <a:ext cx="12190412" cy="139700"/>
-        </p:xfrm>
-        <a:graphic>
-          <a:graphicData uri="http://schemas.openxmlformats.org/presentationml/2006/ole">
-            <mc:AlternateContent xmlns:mc="http://schemas.openxmlformats.org/markup-compatibility/2006">
-              <mc:Choice xmlns:v="urn:schemas-microsoft-com:vml" Requires="v">
-                <p:oleObj spid="_x0000_s3076" name="Image" r:id="rId4" imgW="12190320" imgH="139680" progId="Photoshop.Image.13">
-                  <p:embed/>
-                </p:oleObj>
-              </mc:Choice>
-              <mc:Fallback>
-                <p:oleObj name="Image" r:id="rId4" imgW="12190320" imgH="139680" progId="Photoshop.Image.13">
-                  <p:embed/>
-                  <p:pic>
-                    <p:nvPicPr>
-                      <p:cNvPr id="0" name=""/>
-                      <p:cNvPicPr/>
-                      <p:nvPr/>
-                    </p:nvPicPr>
-                    <p:blipFill>
-                      <a:blip r:embed="rId5"/>
-                      <a:stretch>
-                        <a:fillRect/>
-                      </a:stretch>
-                    </p:blipFill>
-                    <p:spPr>
-                      <a:xfrm>
-                        <a:off x="1588" y="6718300"/>
-                        <a:ext cx="12190412" cy="139700"/>
-                      </a:xfrm>
-                      <a:prstGeom prst="rect">
-                        <a:avLst/>
-                      </a:prstGeom>
-                    </p:spPr>
-                  </p:pic>
-                </p:oleObj>
-              </mc:Fallback>
-            </mc:AlternateContent>
-          </a:graphicData>
-        </a:graphic>
-      </p:graphicFrame>
-      <p:cxnSp>
-        <p:nvCxnSpPr>
-          <p:cNvPr id="9" name="Conector reto 8"/>
-          <p:cNvCxnSpPr/>
-          <p:nvPr/>
-        </p:nvCxnSpPr>
-        <p:spPr>
-          <a:xfrm>
-            <a:off x="445168" y="902374"/>
-            <a:ext cx="6545179" cy="0"/>
-          </a:xfrm>
-          <a:prstGeom prst="line">
-            <a:avLst/>
-          </a:prstGeom>
-          <a:ln/>
-        </p:spPr>
-        <p:style>
-          <a:lnRef idx="3">
-            <a:schemeClr val="accent1"/>
-          </a:lnRef>
-          <a:fillRef idx="0">
-            <a:schemeClr val="accent1"/>
-          </a:fillRef>
-          <a:effectRef idx="2">
-            <a:schemeClr val="accent1"/>
-          </a:effectRef>
-          <a:fontRef idx="minor">
-            <a:schemeClr val="tx1"/>
-          </a:fontRef>
-        </p:style>
-      </p:cxnSp>
-      <p:sp>
-        <p:nvSpPr>
-          <p:cNvPr id="11" name="Espaço Reservado para Data 10"/>
-          <p:cNvSpPr>
-            <a:spLocks noGrp="1"/>
-          </p:cNvSpPr>
-          <p:nvPr>
-            <p:ph type="dt" sz="half" idx="10"/>
-          </p:nvPr>
-        </p:nvSpPr>
-        <p:spPr/>
-        <p:txBody>
-          <a:bodyPr/>
-          <a:lstStyle/>
-          <a:p>
-            <a:fld id="{5B2C3F26-301F-434E-863D-B89F544B9CE4}" type="datetime1">
-              <a:rPr lang="pt-BR" smtClean="0"/>
-              <a:t>27/05/2014</a:t>
-            </a:fld>
-            <a:endParaRPr lang="pt-BR"/>
-          </a:p>
-        </p:txBody>
-      </p:sp>
-      <p:sp>
-        <p:nvSpPr>
-          <p:cNvPr id="12" name="Espaço Reservado para Número de Slide 11"/>
-          <p:cNvSpPr>
-            <a:spLocks noGrp="1"/>
-          </p:cNvSpPr>
-          <p:nvPr>
-            <p:ph type="sldNum" sz="quarter" idx="12"/>
-          </p:nvPr>
-        </p:nvSpPr>
-        <p:spPr/>
-        <p:txBody>
-          <a:bodyPr/>
-          <a:lstStyle/>
-          <a:p>
-            <a:fld id="{31892884-0934-4F3F-B79B-36C387EDB149}" type="slidenum">
-              <a:rPr lang="pt-BR" smtClean="0"/>
-              <a:t>4</a:t>
-            </a:fld>
-            <a:endParaRPr lang="pt-BR"/>
-          </a:p>
-        </p:txBody>
-      </p:sp>
-      <p:sp>
-        <p:nvSpPr>
-          <p:cNvPr id="13" name="Espaço Reservado para Rodapé 12"/>
-          <p:cNvSpPr>
-            <a:spLocks noGrp="1"/>
-          </p:cNvSpPr>
-          <p:nvPr>
-            <p:ph type="ftr" sz="quarter" idx="11"/>
-          </p:nvPr>
-        </p:nvSpPr>
-        <p:spPr/>
-        <p:txBody>
-          <a:bodyPr/>
-          <a:lstStyle/>
-          <a:p>
-            <a:r>
-              <a:rPr lang="pt-BR" smtClean="0"/>
-              <a:t>Universidade Federal de Itajubá</a:t>
-            </a:r>
-            <a:endParaRPr lang="pt-BR"/>
-          </a:p>
-        </p:txBody>
-      </p:sp>
-    </p:spTree>
-    <p:extLst>
-      <p:ext uri="{BB962C8B-B14F-4D97-AF65-F5344CB8AC3E}">
-        <p14:creationId xmlns:p14="http://schemas.microsoft.com/office/powerpoint/2010/main" val="1901103758"/>
-      </p:ext>
-    </p:extLst>
-  </p:cSld>
-  <p:clrMapOvr>
-    <a:masterClrMapping/>
-  </p:clrMapOvr>
-  <mc:AlternateContent xmlns:mc="http://schemas.openxmlformats.org/markup-compatibility/2006">
-    <mc:Choice xmlns:p14="http://schemas.microsoft.com/office/powerpoint/2010/main" Requires="p14">
-      <p:transition p14:dur="0"/>
-    </mc:Choice>
-    <mc:Fallback>
-      <p:transition/>
-    </mc:Fallback>
-  </mc:AlternateContent>
-  <p:timing>
-    <p:tnLst>
-      <p:par>
-        <p:cTn id="1" dur="indefinite" restart="never" nodeType="tmRoot"/>
-      </p:par>
-    </p:tnLst>
-  </p:timing>
-</p:sld>
-</file>
-
-<file path=ppt/slides/slide5.xml><?xml version="1.0" encoding="utf-8"?>
-<p:sld xmlns:a="http://schemas.openxmlformats.org/drawingml/2006/main" xmlns:r="http://schemas.openxmlformats.org/officeDocument/2006/relationships" xmlns:p="http://schemas.openxmlformats.org/presentationml/2006/main">
-  <p:cSld>
-    <p:spTree>
-      <p:nvGrpSpPr>
-        <p:cNvPr id="1" name=""/>
-        <p:cNvGrpSpPr/>
-        <p:nvPr/>
-      </p:nvGrpSpPr>
-      <p:grpSpPr>
-        <a:xfrm>
-          <a:off x="0" y="0"/>
-          <a:ext cx="0" cy="0"/>
-          <a:chOff x="0" y="0"/>
-          <a:chExt cx="0" cy="0"/>
-        </a:xfrm>
-      </p:grpSpPr>
-      <p:sp>
-        <p:nvSpPr>
-          <p:cNvPr id="2" name="Título 1"/>
-          <p:cNvSpPr>
-            <a:spLocks noGrp="1"/>
-          </p:cNvSpPr>
-          <p:nvPr>
-            <p:ph type="title"/>
-          </p:nvPr>
-        </p:nvSpPr>
-        <p:spPr>
-          <a:xfrm>
-            <a:off x="838200" y="304968"/>
-            <a:ext cx="10515600" cy="453022"/>
-          </a:xfrm>
-        </p:spPr>
-        <p:txBody>
-          <a:bodyPr>
-            <a:normAutofit fontScale="90000"/>
-          </a:bodyPr>
-          <a:lstStyle/>
-          <a:p>
-            <a:r>
-              <a:rPr lang="pt-BR" dirty="0" smtClean="0"/>
-              <a:t>Apresentar a ideia que deu certo</a:t>
-            </a:r>
-            <a:endParaRPr lang="pt-BR" dirty="0"/>
-          </a:p>
-        </p:txBody>
-      </p:sp>
-      <p:sp>
-        <p:nvSpPr>
-          <p:cNvPr id="3" name="Espaço Reservado para Conteúdo 2"/>
-          <p:cNvSpPr>
-            <a:spLocks noGrp="1"/>
-          </p:cNvSpPr>
-          <p:nvPr>
-            <p:ph idx="1"/>
-          </p:nvPr>
-        </p:nvSpPr>
-        <p:spPr>
-          <a:xfrm>
-            <a:off x="838200" y="1634668"/>
-            <a:ext cx="10515600" cy="4351338"/>
-          </a:xfrm>
-        </p:spPr>
-        <p:txBody>
-          <a:bodyPr/>
-          <a:lstStyle/>
-          <a:p>
-            <a:pPr>
-              <a:buClr>
-                <a:schemeClr val="accent1">
-                  <a:lumMod val="75000"/>
-                </a:schemeClr>
-              </a:buClr>
-              <a:buFont typeface="Wingdings" panose="05000000000000000000" pitchFamily="2" charset="2"/>
-              <a:buChar char="q"/>
-            </a:pPr>
-            <a:r>
-              <a:rPr lang="pt-BR" dirty="0" smtClean="0"/>
-              <a:t>Texto</a:t>
-            </a:r>
-          </a:p>
-          <a:p>
-            <a:pPr>
-              <a:buClr>
-                <a:schemeClr val="accent1">
-                  <a:lumMod val="75000"/>
-                </a:schemeClr>
-              </a:buClr>
-              <a:buFont typeface="Wingdings" panose="05000000000000000000" pitchFamily="2" charset="2"/>
-              <a:buChar char="q"/>
-            </a:pPr>
-            <a:r>
-              <a:rPr lang="pt-BR" dirty="0" smtClean="0"/>
-              <a:t>Texto</a:t>
-            </a:r>
-          </a:p>
-          <a:p>
-            <a:pPr>
-              <a:buClr>
-                <a:schemeClr val="accent1">
-                  <a:lumMod val="75000"/>
-                </a:schemeClr>
-              </a:buClr>
-              <a:buFont typeface="Wingdings" panose="05000000000000000000" pitchFamily="2" charset="2"/>
-              <a:buChar char="q"/>
-            </a:pPr>
-            <a:r>
-              <a:rPr lang="pt-BR" dirty="0" smtClean="0"/>
-              <a:t>Texto</a:t>
-            </a:r>
-          </a:p>
-          <a:p>
-            <a:pPr>
-              <a:buClr>
-                <a:schemeClr val="accent1">
-                  <a:lumMod val="75000"/>
-                </a:schemeClr>
-              </a:buClr>
-              <a:buFont typeface="Wingdings" panose="05000000000000000000" pitchFamily="2" charset="2"/>
-              <a:buChar char="q"/>
-            </a:pPr>
-            <a:r>
-              <a:rPr lang="pt-BR" dirty="0" smtClean="0"/>
-              <a:t>Texto</a:t>
-            </a:r>
-            <a:endParaRPr lang="pt-BR" dirty="0"/>
-          </a:p>
-        </p:txBody>
-      </p:sp>
-      <p:graphicFrame>
-        <p:nvGraphicFramePr>
-          <p:cNvPr id="7" name="Objeto 6"/>
-          <p:cNvGraphicFramePr>
-            <a:graphicFrameLocks noChangeAspect="1"/>
-          </p:cNvGraphicFramePr>
-          <p:nvPr>
-            <p:extLst>
-              <p:ext uri="{D42A27DB-BD31-4B8C-83A1-F6EECF244321}">
-                <p14:modId xmlns:p14="http://schemas.microsoft.com/office/powerpoint/2010/main" val="1993283754"/>
-              </p:ext>
-            </p:extLst>
-          </p:nvPr>
-        </p:nvGraphicFramePr>
-        <p:xfrm>
-          <a:off x="1588" y="6718300"/>
-          <a:ext cx="12190412" cy="139700"/>
-        </p:xfrm>
-        <a:graphic>
-          <a:graphicData uri="http://schemas.openxmlformats.org/presentationml/2006/ole">
-            <mc:AlternateContent xmlns:mc="http://schemas.openxmlformats.org/markup-compatibility/2006">
-              <mc:Choice xmlns:v="urn:schemas-microsoft-com:vml" Requires="v">
-                <p:oleObj spid="_x0000_s4100" name="Image" r:id="rId4" imgW="12190320" imgH="139680" progId="Photoshop.Image.13">
-                  <p:embed/>
-                </p:oleObj>
-              </mc:Choice>
-              <mc:Fallback>
-                <p:oleObj name="Image" r:id="rId4" imgW="12190320" imgH="139680" progId="Photoshop.Image.13">
-                  <p:embed/>
-                  <p:pic>
-                    <p:nvPicPr>
-                      <p:cNvPr id="0" name=""/>
-                      <p:cNvPicPr/>
-                      <p:nvPr/>
-                    </p:nvPicPr>
-                    <p:blipFill>
-                      <a:blip r:embed="rId5"/>
-                      <a:stretch>
-                        <a:fillRect/>
-                      </a:stretch>
-                    </p:blipFill>
-                    <p:spPr>
-                      <a:xfrm>
-                        <a:off x="1588" y="6718300"/>
-                        <a:ext cx="12190412" cy="139700"/>
-                      </a:xfrm>
-                      <a:prstGeom prst="rect">
-                        <a:avLst/>
-                      </a:prstGeom>
-                    </p:spPr>
-                  </p:pic>
-                </p:oleObj>
-              </mc:Fallback>
-            </mc:AlternateContent>
-          </a:graphicData>
-        </a:graphic>
-      </p:graphicFrame>
-      <p:cxnSp>
-        <p:nvCxnSpPr>
-          <p:cNvPr id="9" name="Conector reto 8"/>
-          <p:cNvCxnSpPr/>
-          <p:nvPr/>
-        </p:nvCxnSpPr>
-        <p:spPr>
-          <a:xfrm>
-            <a:off x="445168" y="902374"/>
-            <a:ext cx="6545179" cy="0"/>
-          </a:xfrm>
-          <a:prstGeom prst="line">
-            <a:avLst/>
-          </a:prstGeom>
-          <a:ln/>
-        </p:spPr>
-        <p:style>
-          <a:lnRef idx="3">
-            <a:schemeClr val="accent1"/>
-          </a:lnRef>
-          <a:fillRef idx="0">
-            <a:schemeClr val="accent1"/>
-          </a:fillRef>
-          <a:effectRef idx="2">
-            <a:schemeClr val="accent1"/>
-          </a:effectRef>
-          <a:fontRef idx="minor">
-            <a:schemeClr val="tx1"/>
-          </a:fontRef>
-        </p:style>
-      </p:cxnSp>
-      <p:sp>
-        <p:nvSpPr>
-          <p:cNvPr id="11" name="Espaço Reservado para Data 10"/>
-          <p:cNvSpPr>
-            <a:spLocks noGrp="1"/>
-          </p:cNvSpPr>
-          <p:nvPr>
-            <p:ph type="dt" sz="half" idx="10"/>
-          </p:nvPr>
-        </p:nvSpPr>
-        <p:spPr/>
-        <p:txBody>
-          <a:bodyPr/>
-          <a:lstStyle/>
-          <a:p>
-            <a:fld id="{5B2C3F26-301F-434E-863D-B89F544B9CE4}" type="datetime1">
-              <a:rPr lang="pt-BR" smtClean="0"/>
-              <a:t>27/05/2014</a:t>
-            </a:fld>
-            <a:endParaRPr lang="pt-BR"/>
-          </a:p>
-        </p:txBody>
-      </p:sp>
-      <p:sp>
-        <p:nvSpPr>
-          <p:cNvPr id="12" name="Espaço Reservado para Número de Slide 11"/>
-          <p:cNvSpPr>
-            <a:spLocks noGrp="1"/>
-          </p:cNvSpPr>
-          <p:nvPr>
-            <p:ph type="sldNum" sz="quarter" idx="12"/>
-          </p:nvPr>
-        </p:nvSpPr>
-        <p:spPr/>
-        <p:txBody>
-          <a:bodyPr/>
-          <a:lstStyle/>
-          <a:p>
-            <a:fld id="{31892884-0934-4F3F-B79B-36C387EDB149}" type="slidenum">
-              <a:rPr lang="pt-BR" smtClean="0"/>
-              <a:t>5</a:t>
-            </a:fld>
-            <a:endParaRPr lang="pt-BR"/>
-          </a:p>
-        </p:txBody>
-      </p:sp>
-      <p:sp>
-        <p:nvSpPr>
-          <p:cNvPr id="13" name="Espaço Reservado para Rodapé 12"/>
-          <p:cNvSpPr>
-            <a:spLocks noGrp="1"/>
-          </p:cNvSpPr>
-          <p:nvPr>
-            <p:ph type="ftr" sz="quarter" idx="11"/>
-          </p:nvPr>
-        </p:nvSpPr>
-        <p:spPr/>
-        <p:txBody>
-          <a:bodyPr/>
-          <a:lstStyle/>
-          <a:p>
-            <a:r>
-              <a:rPr lang="pt-BR" smtClean="0"/>
-              <a:t>Universidade Federal de Itajubá</a:t>
-            </a:r>
-            <a:endParaRPr lang="pt-BR"/>
-          </a:p>
-        </p:txBody>
-      </p:sp>
-    </p:spTree>
-    <p:extLst>
-      <p:ext uri="{BB962C8B-B14F-4D97-AF65-F5344CB8AC3E}">
-        <p14:creationId xmlns:p14="http://schemas.microsoft.com/office/powerpoint/2010/main" val="2012665678"/>
-      </p:ext>
-    </p:extLst>
-  </p:cSld>
-  <p:clrMapOvr>
-    <a:masterClrMapping/>
-  </p:clrMapOvr>
-  <mc:AlternateContent xmlns:mc="http://schemas.openxmlformats.org/markup-compatibility/2006">
-    <mc:Choice xmlns:p15="http://schemas.microsoft.com/office/powerpoint/2012/main" Requires="p15">
-      <p:transition xmlns:p14="http://schemas.microsoft.com/office/powerpoint/2010/main" spd="slow" p14:dur="2000">
-        <p15:prstTrans prst="crush"/>
-      </p:transition>
-    </mc:Choice>
-    <mc:Fallback>
-      <p:transition spd="slow">
-        <p:fade/>
-      </p:transition>
-    </mc:Fallback>
-  </mc:AlternateContent>
-  <p:timing>
-    <p:tnLst>
-      <p:par>
-        <p:cTn id="1" dur="indefinite" restart="never" nodeType="tmRoot"/>
-      </p:par>
-    </p:tnLst>
-  </p:timing>
-</p:sld>
-</file>
-
 <file path=ppt/theme/theme1.xml><?xml version="1.0" encoding="utf-8"?>
 <a:theme xmlns:a="http://schemas.openxmlformats.org/drawingml/2006/main" name="Tema do Office">
   <a:themeElements>
-    <a:clrScheme name="Escritório">
+    <a:clrScheme name="Tema do Office">
       <a:dk1>
         <a:sysClr val="windowText" lastClr="000000"/>
       </a:dk1>
@@ -5437,7 +4572,7 @@
         <a:srgbClr val="954F72"/>
       </a:folHlink>
     </a:clrScheme>
-    <a:fontScheme name="Escritório">
+    <a:fontScheme name="Tema do Office">
       <a:majorFont>
         <a:latin typeface="Calibri Light" panose="020F0302020204030204"/>
         <a:ea typeface=""/>
@@ -5509,7 +4644,7 @@
         <a:font script="Geor" typeface="Sylfaen"/>
       </a:minorFont>
     </a:fontScheme>
-    <a:fmtScheme name="Escritório">
+    <a:fmtScheme name="Tema do Office">
       <a:fillStyleLst>
         <a:solidFill>
           <a:schemeClr val="phClr"/>
@@ -5647,29 +4782,7 @@
       </a:bgFillStyleLst>
     </a:fmtScheme>
   </a:themeElements>
-  <a:objectDefaults>
-    <a:lnDef>
-      <a:spPr>
-        <a:ln/>
-      </a:spPr>
-      <a:bodyPr/>
-      <a:lstStyle/>
-      <a:style>
-        <a:lnRef idx="3">
-          <a:schemeClr val="accent1"/>
-        </a:lnRef>
-        <a:fillRef idx="0">
-          <a:schemeClr val="accent1"/>
-        </a:fillRef>
-        <a:effectRef idx="2">
-          <a:schemeClr val="accent1"/>
-        </a:effectRef>
-        <a:fontRef idx="minor">
-          <a:schemeClr val="tx1"/>
-        </a:fontRef>
-      </a:style>
-    </a:lnDef>
-  </a:objectDefaults>
+  <a:objectDefaults/>
   <a:extraClrSchemeLst/>
   <a:extLst>
     <a:ext uri="{05A4C25C-085E-4340-85A3-A5531E510DB2}">

</xml_diff>